<commit_message>
updates for Monday's class
</commit_message>
<xml_diff>
--- a/models-comp-comm/slide_presentations/.hidden/process.pptx
+++ b/models-comp-comm/slide_presentations/.hidden/process.pptx
@@ -5,36 +5,37 @@
     <p:sldMasterId id="2147483659" r:id="rId1"/>
   </p:sldMasterIdLst>
   <p:notesMasterIdLst>
-    <p:notesMasterId r:id="rId12"/>
+    <p:notesMasterId r:id="rId13"/>
   </p:notesMasterIdLst>
   <p:sldIdLst>
     <p:sldId id="256" r:id="rId2"/>
     <p:sldId id="257" r:id="rId3"/>
-    <p:sldId id="258" r:id="rId4"/>
-    <p:sldId id="259" r:id="rId5"/>
-    <p:sldId id="260" r:id="rId6"/>
-    <p:sldId id="261" r:id="rId7"/>
-    <p:sldId id="262" r:id="rId8"/>
-    <p:sldId id="263" r:id="rId9"/>
-    <p:sldId id="264" r:id="rId10"/>
-    <p:sldId id="265" r:id="rId11"/>
+    <p:sldId id="266" r:id="rId4"/>
+    <p:sldId id="258" r:id="rId5"/>
+    <p:sldId id="259" r:id="rId6"/>
+    <p:sldId id="260" r:id="rId7"/>
+    <p:sldId id="261" r:id="rId8"/>
+    <p:sldId id="262" r:id="rId9"/>
+    <p:sldId id="263" r:id="rId10"/>
+    <p:sldId id="264" r:id="rId11"/>
+    <p:sldId id="265" r:id="rId12"/>
   </p:sldIdLst>
   <p:sldSz cx="9144000" cy="5143500" type="screen16x9"/>
   <p:notesSz cx="6858000" cy="9144000"/>
   <p:embeddedFontLst>
     <p:embeddedFont>
       <p:font typeface="Roboto" panose="02000000000000000000" pitchFamily="2" charset="0"/>
-      <p:regular r:id="rId13"/>
-      <p:bold r:id="rId14"/>
-      <p:italic r:id="rId15"/>
-      <p:boldItalic r:id="rId16"/>
+      <p:regular r:id="rId14"/>
+      <p:bold r:id="rId15"/>
+      <p:italic r:id="rId16"/>
+      <p:boldItalic r:id="rId17"/>
     </p:embeddedFont>
     <p:embeddedFont>
       <p:font typeface="Source Code Pro" panose="020B0509030403020204" pitchFamily="49" charset="0"/>
-      <p:regular r:id="rId17"/>
-      <p:bold r:id="rId18"/>
-      <p:italic r:id="rId19"/>
-      <p:boldItalic r:id="rId20"/>
+      <p:regular r:id="rId18"/>
+      <p:bold r:id="rId19"/>
+      <p:italic r:id="rId20"/>
+      <p:boldItalic r:id="rId21"/>
     </p:embeddedFont>
   </p:embeddedFontLst>
   <p:defaultTextStyle>
@@ -835,6 +836,110 @@
   <p:cSld>
     <p:spTree>
       <p:nvGrpSpPr>
+        <p:cNvPr id="1" name="Shape 232"/>
+        <p:cNvGrpSpPr/>
+        <p:nvPr/>
+      </p:nvGrpSpPr>
+      <p:grpSpPr>
+        <a:xfrm>
+          <a:off x="0" y="0"/>
+          <a:ext cx="0" cy="0"/>
+          <a:chOff x="0" y="0"/>
+          <a:chExt cx="0" cy="0"/>
+        </a:xfrm>
+      </p:grpSpPr>
+      <p:sp>
+        <p:nvSpPr>
+          <p:cNvPr id="233" name="Google Shape;233;gbc6dd52996_0_243:notes"/>
+          <p:cNvSpPr>
+            <a:spLocks noGrp="1" noRot="1" noChangeAspect="1"/>
+          </p:cNvSpPr>
+          <p:nvPr>
+            <p:ph type="sldImg" idx="2"/>
+          </p:nvPr>
+        </p:nvSpPr>
+        <p:spPr>
+          <a:xfrm>
+            <a:off x="381000" y="685800"/>
+            <a:ext cx="6096000" cy="3429000"/>
+          </a:xfrm>
+          <a:custGeom>
+            <a:avLst/>
+            <a:gdLst/>
+            <a:ahLst/>
+            <a:cxnLst/>
+            <a:rect l="l" t="t" r="r" b="b"/>
+            <a:pathLst>
+              <a:path w="120000" h="120000" extrusionOk="0">
+                <a:moveTo>
+                  <a:pt x="0" y="0"/>
+                </a:moveTo>
+                <a:lnTo>
+                  <a:pt x="120000" y="0"/>
+                </a:lnTo>
+                <a:lnTo>
+                  <a:pt x="120000" y="120000"/>
+                </a:lnTo>
+                <a:lnTo>
+                  <a:pt x="0" y="120000"/>
+                </a:lnTo>
+                <a:close/>
+              </a:path>
+            </a:pathLst>
+          </a:custGeom>
+        </p:spPr>
+      </p:sp>
+      <p:sp>
+        <p:nvSpPr>
+          <p:cNvPr id="234" name="Google Shape;234;gbc6dd52996_0_243:notes"/>
+          <p:cNvSpPr txBox="1">
+            <a:spLocks noGrp="1"/>
+          </p:cNvSpPr>
+          <p:nvPr>
+            <p:ph type="body" idx="1"/>
+          </p:nvPr>
+        </p:nvSpPr>
+        <p:spPr>
+          <a:xfrm>
+            <a:off x="685800" y="4343400"/>
+            <a:ext cx="5486400" cy="4114800"/>
+          </a:xfrm>
+          <a:prstGeom prst="rect">
+            <a:avLst/>
+          </a:prstGeom>
+        </p:spPr>
+        <p:txBody>
+          <a:bodyPr spcFirstLastPara="1" wrap="square" lIns="91425" tIns="91425" rIns="91425" bIns="91425" anchor="t" anchorCtr="0">
+            <a:noAutofit/>
+          </a:bodyPr>
+          <a:lstStyle/>
+          <a:p>
+            <a:pPr marL="0" lvl="0" indent="0" algn="l" rtl="0">
+              <a:spcBef>
+                <a:spcPts val="0"/>
+              </a:spcBef>
+              <a:spcAft>
+                <a:spcPts val="0"/>
+              </a:spcAft>
+              <a:buNone/>
+            </a:pPr>
+            <a:endParaRPr/>
+          </a:p>
+        </p:txBody>
+      </p:sp>
+    </p:spTree>
+  </p:cSld>
+  <p:clrMapOvr>
+    <a:masterClrMapping/>
+  </p:clrMapOvr>
+</p:notes>
+</file>
+
+<file path=ppt/notesSlides/notesSlide11.xml><?xml version="1.0" encoding="utf-8"?>
+<p:notes xmlns:a="http://schemas.openxmlformats.org/drawingml/2006/main" xmlns:r="http://schemas.openxmlformats.org/officeDocument/2006/relationships" xmlns:p="http://schemas.openxmlformats.org/presentationml/2006/main" showMasterSp="0" showMasterPhAnim="0">
+  <p:cSld>
+    <p:spTree>
+      <p:nvGrpSpPr>
         <p:cNvPr id="1" name="Shape 265"/>
         <p:cNvGrpSpPr/>
         <p:nvPr/>
@@ -1043,7 +1148,7 @@
   <p:cSld>
     <p:spTree>
       <p:nvGrpSpPr>
-        <p:cNvPr id="1" name="Shape 113"/>
+        <p:cNvPr id="1" name="Shape 229"/>
         <p:cNvGrpSpPr/>
         <p:nvPr/>
       </p:nvGrpSpPr>
@@ -1057,7 +1162,7 @@
       </p:grpSpPr>
       <p:sp>
         <p:nvSpPr>
-          <p:cNvPr id="114" name="Google Shape;114;gbc6dd52996_0_174:notes"/>
+          <p:cNvPr id="230" name="Google Shape;230;gf02e65bbb2_0_185:notes"/>
           <p:cNvSpPr>
             <a:spLocks noGrp="1" noRot="1" noChangeAspect="1"/>
           </p:cNvSpPr>
@@ -1098,7 +1203,7 @@
       </p:sp>
       <p:sp>
         <p:nvSpPr>
-          <p:cNvPr id="115" name="Google Shape;115;gbc6dd52996_0_174:notes"/>
+          <p:cNvPr id="231" name="Google Shape;231;gf02e65bbb2_0_185:notes"/>
           <p:cNvSpPr txBox="1">
             <a:spLocks noGrp="1"/>
           </p:cNvSpPr>
@@ -1147,7 +1252,7 @@
   <p:cSld>
     <p:spTree>
       <p:nvGrpSpPr>
-        <p:cNvPr id="1" name="Shape 126"/>
+        <p:cNvPr id="1" name="Shape 113"/>
         <p:cNvGrpSpPr/>
         <p:nvPr/>
       </p:nvGrpSpPr>
@@ -1161,7 +1266,7 @@
       </p:grpSpPr>
       <p:sp>
         <p:nvSpPr>
-          <p:cNvPr id="127" name="Google Shape;127;gbc6dd52996_0_113:notes"/>
+          <p:cNvPr id="114" name="Google Shape;114;gbc6dd52996_0_174:notes"/>
           <p:cNvSpPr>
             <a:spLocks noGrp="1" noRot="1" noChangeAspect="1"/>
           </p:cNvSpPr>
@@ -1171,7 +1276,7 @@
         </p:nvSpPr>
         <p:spPr>
           <a:xfrm>
-            <a:off x="381300" y="685800"/>
+            <a:off x="381000" y="685800"/>
             <a:ext cx="6096000" cy="3429000"/>
           </a:xfrm>
           <a:custGeom>
@@ -1202,7 +1307,7 @@
       </p:sp>
       <p:sp>
         <p:nvSpPr>
-          <p:cNvPr id="128" name="Google Shape;128;gbc6dd52996_0_113:notes"/>
+          <p:cNvPr id="115" name="Google Shape;115;gbc6dd52996_0_174:notes"/>
           <p:cNvSpPr txBox="1">
             <a:spLocks noGrp="1"/>
           </p:cNvSpPr>
@@ -1251,7 +1356,7 @@
   <p:cSld>
     <p:spTree>
       <p:nvGrpSpPr>
-        <p:cNvPr id="1" name="Shape 132"/>
+        <p:cNvPr id="1" name="Shape 126"/>
         <p:cNvGrpSpPr/>
         <p:nvPr/>
       </p:nvGrpSpPr>
@@ -1265,7 +1370,7 @@
       </p:grpSpPr>
       <p:sp>
         <p:nvSpPr>
-          <p:cNvPr id="133" name="Google Shape;133;gbc6dd52996_0_381:notes"/>
+          <p:cNvPr id="127" name="Google Shape;127;gbc6dd52996_0_113:notes"/>
           <p:cNvSpPr>
             <a:spLocks noGrp="1" noRot="1" noChangeAspect="1"/>
           </p:cNvSpPr>
@@ -1275,7 +1380,7 @@
         </p:nvSpPr>
         <p:spPr>
           <a:xfrm>
-            <a:off x="381000" y="685800"/>
+            <a:off x="381300" y="685800"/>
             <a:ext cx="6096000" cy="3429000"/>
           </a:xfrm>
           <a:custGeom>
@@ -1306,7 +1411,7 @@
       </p:sp>
       <p:sp>
         <p:nvSpPr>
-          <p:cNvPr id="134" name="Google Shape;134;gbc6dd52996_0_381:notes"/>
+          <p:cNvPr id="128" name="Google Shape;128;gbc6dd52996_0_113:notes"/>
           <p:cNvSpPr txBox="1">
             <a:spLocks noGrp="1"/>
           </p:cNvSpPr>
@@ -1355,7 +1460,7 @@
   <p:cSld>
     <p:spTree>
       <p:nvGrpSpPr>
-        <p:cNvPr id="1" name="Shape 170"/>
+        <p:cNvPr id="1" name="Shape 132"/>
         <p:cNvGrpSpPr/>
         <p:nvPr/>
       </p:nvGrpSpPr>
@@ -1369,7 +1474,7 @@
       </p:grpSpPr>
       <p:sp>
         <p:nvSpPr>
-          <p:cNvPr id="171" name="Google Shape;171;gbc6dd52996_0_118:notes"/>
+          <p:cNvPr id="133" name="Google Shape;133;gbc6dd52996_0_381:notes"/>
           <p:cNvSpPr>
             <a:spLocks noGrp="1" noRot="1" noChangeAspect="1"/>
           </p:cNvSpPr>
@@ -1379,7 +1484,7 @@
         </p:nvSpPr>
         <p:spPr>
           <a:xfrm>
-            <a:off x="381300" y="685800"/>
+            <a:off x="381000" y="685800"/>
             <a:ext cx="6096000" cy="3429000"/>
           </a:xfrm>
           <a:custGeom>
@@ -1410,7 +1515,7 @@
       </p:sp>
       <p:sp>
         <p:nvSpPr>
-          <p:cNvPr id="172" name="Google Shape;172;gbc6dd52996_0_118:notes"/>
+          <p:cNvPr id="134" name="Google Shape;134;gbc6dd52996_0_381:notes"/>
           <p:cNvSpPr txBox="1">
             <a:spLocks noGrp="1"/>
           </p:cNvSpPr>
@@ -1459,7 +1564,7 @@
   <p:cSld>
     <p:spTree>
       <p:nvGrpSpPr>
-        <p:cNvPr id="1" name="Shape 181"/>
+        <p:cNvPr id="1" name="Shape 170"/>
         <p:cNvGrpSpPr/>
         <p:nvPr/>
       </p:nvGrpSpPr>
@@ -1473,7 +1578,7 @@
       </p:grpSpPr>
       <p:sp>
         <p:nvSpPr>
-          <p:cNvPr id="182" name="Google Shape;182;gbc6dd52996_0_216:notes"/>
+          <p:cNvPr id="171" name="Google Shape;171;gbc6dd52996_0_118:notes"/>
           <p:cNvSpPr>
             <a:spLocks noGrp="1" noRot="1" noChangeAspect="1"/>
           </p:cNvSpPr>
@@ -1514,7 +1619,7 @@
       </p:sp>
       <p:sp>
         <p:nvSpPr>
-          <p:cNvPr id="183" name="Google Shape;183;gbc6dd52996_0_216:notes"/>
+          <p:cNvPr id="172" name="Google Shape;172;gbc6dd52996_0_118:notes"/>
           <p:cNvSpPr txBox="1">
             <a:spLocks noGrp="1"/>
           </p:cNvSpPr>
@@ -1563,7 +1668,7 @@
   <p:cSld>
     <p:spTree>
       <p:nvGrpSpPr>
-        <p:cNvPr id="1" name="Shape 215"/>
+        <p:cNvPr id="1" name="Shape 181"/>
         <p:cNvGrpSpPr/>
         <p:nvPr/>
       </p:nvGrpSpPr>
@@ -1577,7 +1682,7 @@
       </p:grpSpPr>
       <p:sp>
         <p:nvSpPr>
-          <p:cNvPr id="216" name="Google Shape;216;gbc6dd52996_0_202:notes"/>
+          <p:cNvPr id="182" name="Google Shape;182;gbc6dd52996_0_216:notes"/>
           <p:cNvSpPr>
             <a:spLocks noGrp="1" noRot="1" noChangeAspect="1"/>
           </p:cNvSpPr>
@@ -1587,7 +1692,7 @@
         </p:nvSpPr>
         <p:spPr>
           <a:xfrm>
-            <a:off x="381000" y="685800"/>
+            <a:off x="381300" y="685800"/>
             <a:ext cx="6096000" cy="3429000"/>
           </a:xfrm>
           <a:custGeom>
@@ -1618,7 +1723,7 @@
       </p:sp>
       <p:sp>
         <p:nvSpPr>
-          <p:cNvPr id="217" name="Google Shape;217;gbc6dd52996_0_202:notes"/>
+          <p:cNvPr id="183" name="Google Shape;183;gbc6dd52996_0_216:notes"/>
           <p:cNvSpPr txBox="1">
             <a:spLocks noGrp="1"/>
           </p:cNvSpPr>
@@ -1650,7 +1755,7 @@
               </a:spcAft>
               <a:buNone/>
             </a:pPr>
-            <a:endParaRPr dirty="0"/>
+            <a:endParaRPr/>
           </a:p>
         </p:txBody>
       </p:sp>
@@ -1667,7 +1772,7 @@
   <p:cSld>
     <p:spTree>
       <p:nvGrpSpPr>
-        <p:cNvPr id="1" name="Shape 232"/>
+        <p:cNvPr id="1" name="Shape 215"/>
         <p:cNvGrpSpPr/>
         <p:nvPr/>
       </p:nvGrpSpPr>
@@ -1681,7 +1786,7 @@
       </p:grpSpPr>
       <p:sp>
         <p:nvSpPr>
-          <p:cNvPr id="233" name="Google Shape;233;gbc6dd52996_0_243:notes"/>
+          <p:cNvPr id="216" name="Google Shape;216;gbc6dd52996_0_202:notes"/>
           <p:cNvSpPr>
             <a:spLocks noGrp="1" noRot="1" noChangeAspect="1"/>
           </p:cNvSpPr>
@@ -1722,7 +1827,7 @@
       </p:sp>
       <p:sp>
         <p:nvSpPr>
-          <p:cNvPr id="234" name="Google Shape;234;gbc6dd52996_0_243:notes"/>
+          <p:cNvPr id="217" name="Google Shape;217;gbc6dd52996_0_202:notes"/>
           <p:cNvSpPr txBox="1">
             <a:spLocks noGrp="1"/>
           </p:cNvSpPr>
@@ -1754,7 +1859,7 @@
               </a:spcAft>
               <a:buNone/>
             </a:pPr>
-            <a:endParaRPr/>
+            <a:endParaRPr dirty="0"/>
           </a:p>
         </p:txBody>
       </p:sp>
@@ -8715,6 +8820,1580 @@
   <p:cSld>
     <p:spTree>
       <p:nvGrpSpPr>
+        <p:cNvPr id="1" name="Shape 235"/>
+        <p:cNvGrpSpPr/>
+        <p:nvPr/>
+      </p:nvGrpSpPr>
+      <p:grpSpPr>
+        <a:xfrm>
+          <a:off x="0" y="0"/>
+          <a:ext cx="0" cy="0"/>
+          <a:chOff x="0" y="0"/>
+          <a:chExt cx="0" cy="0"/>
+        </a:xfrm>
+      </p:grpSpPr>
+      <p:sp>
+        <p:nvSpPr>
+          <p:cNvPr id="236" name="Google Shape;236;p21"/>
+          <p:cNvSpPr txBox="1">
+            <a:spLocks noGrp="1"/>
+          </p:cNvSpPr>
+          <p:nvPr>
+            <p:ph type="title"/>
+          </p:nvPr>
+        </p:nvSpPr>
+        <p:spPr>
+          <a:xfrm>
+            <a:off x="311700" y="445025"/>
+            <a:ext cx="8520600" cy="572700"/>
+          </a:xfrm>
+          <a:prstGeom prst="rect">
+            <a:avLst/>
+          </a:prstGeom>
+        </p:spPr>
+        <p:txBody>
+          <a:bodyPr spcFirstLastPara="1" wrap="square" lIns="91425" tIns="91425" rIns="91425" bIns="91425" anchor="t" anchorCtr="0">
+            <a:normAutofit fontScale="90000"/>
+          </a:bodyPr>
+          <a:lstStyle/>
+          <a:p>
+            <a:pPr marL="0" lvl="0" indent="0" algn="l" rtl="0">
+              <a:spcBef>
+                <a:spcPts val="0"/>
+              </a:spcBef>
+              <a:spcAft>
+                <a:spcPts val="0"/>
+              </a:spcAft>
+              <a:buNone/>
+            </a:pPr>
+            <a:r>
+              <a:rPr lang="en"/>
+              <a:t>Memory</a:t>
+            </a:r>
+            <a:endParaRPr/>
+          </a:p>
+        </p:txBody>
+      </p:sp>
+      <p:sp>
+        <p:nvSpPr>
+          <p:cNvPr id="237" name="Google Shape;237;p21"/>
+          <p:cNvSpPr txBox="1">
+            <a:spLocks noGrp="1"/>
+          </p:cNvSpPr>
+          <p:nvPr>
+            <p:ph type="body" idx="1"/>
+          </p:nvPr>
+        </p:nvSpPr>
+        <p:spPr>
+          <a:xfrm>
+            <a:off x="311700" y="1152475"/>
+            <a:ext cx="8520600" cy="3416400"/>
+          </a:xfrm>
+          <a:prstGeom prst="rect">
+            <a:avLst/>
+          </a:prstGeom>
+        </p:spPr>
+        <p:txBody>
+          <a:bodyPr spcFirstLastPara="1" wrap="square" lIns="91425" tIns="91425" rIns="91425" bIns="91425" anchor="t" anchorCtr="0">
+            <a:normAutofit fontScale="92500" lnSpcReduction="20000"/>
+          </a:bodyPr>
+          <a:lstStyle/>
+          <a:p>
+            <a:pPr marL="457200" lvl="0" indent="-342900" algn="l" rtl="0">
+              <a:spcBef>
+                <a:spcPts val="0"/>
+              </a:spcBef>
+              <a:spcAft>
+                <a:spcPts val="0"/>
+              </a:spcAft>
+              <a:buSzPts val="1800"/>
+              <a:buChar char="●"/>
+            </a:pPr>
+            <a:r>
+              <a:rPr lang="en" dirty="0"/>
+              <a:t>We all know what an array is right!</a:t>
+            </a:r>
+            <a:endParaRPr dirty="0"/>
+          </a:p>
+          <a:p>
+            <a:pPr marL="914400" lvl="1" indent="-317500" algn="l" rtl="0">
+              <a:spcBef>
+                <a:spcPts val="0"/>
+              </a:spcBef>
+              <a:spcAft>
+                <a:spcPts val="0"/>
+              </a:spcAft>
+              <a:buSzPts val="1400"/>
+              <a:buChar char="○"/>
+            </a:pPr>
+            <a:r>
+              <a:rPr lang="en" dirty="0"/>
+              <a:t>Memory is just an array of integers (from 0..255):</a:t>
+            </a:r>
+            <a:endParaRPr dirty="0"/>
+          </a:p>
+          <a:p>
+            <a:pPr marL="1371600" lvl="2" indent="-317500" algn="l" rtl="0">
+              <a:spcBef>
+                <a:spcPts val="0"/>
+              </a:spcBef>
+              <a:spcAft>
+                <a:spcPts val="0"/>
+              </a:spcAft>
+              <a:buSzPts val="1400"/>
+              <a:buChar char="■"/>
+            </a:pPr>
+            <a:r>
+              <a:rPr lang="en" dirty="0"/>
+              <a:t>mem[ index ] = value</a:t>
+            </a:r>
+            <a:endParaRPr dirty="0"/>
+          </a:p>
+          <a:p>
+            <a:pPr marL="457200" lvl="0" indent="-342900" algn="l" rtl="0">
+              <a:spcBef>
+                <a:spcPts val="0"/>
+              </a:spcBef>
+              <a:spcAft>
+                <a:spcPts val="0"/>
+              </a:spcAft>
+              <a:buSzPts val="1800"/>
+              <a:buChar char="●"/>
+            </a:pPr>
+            <a:r>
+              <a:rPr lang="en" dirty="0"/>
+              <a:t>Do you know what an associative array is?</a:t>
+            </a:r>
+            <a:endParaRPr dirty="0"/>
+          </a:p>
+          <a:p>
+            <a:pPr marL="914400" lvl="1" indent="-317500" algn="l" rtl="0">
+              <a:spcBef>
+                <a:spcPts val="0"/>
+              </a:spcBef>
+              <a:spcAft>
+                <a:spcPts val="0"/>
+              </a:spcAft>
+              <a:buSzPts val="1400"/>
+              <a:buChar char="○"/>
+            </a:pPr>
+            <a:r>
+              <a:rPr lang="en" dirty="0"/>
+              <a:t>It's just an array that stores both the </a:t>
+            </a:r>
+            <a:r>
+              <a:rPr lang="en" dirty="0" err="1"/>
+              <a:t>lval</a:t>
+            </a:r>
+            <a:r>
+              <a:rPr lang="en" dirty="0"/>
+              <a:t> and </a:t>
+            </a:r>
+            <a:r>
+              <a:rPr lang="en" dirty="0" err="1"/>
+              <a:t>rval</a:t>
+            </a:r>
+            <a:r>
+              <a:rPr lang="en" dirty="0"/>
+              <a:t> of a variable: </a:t>
+            </a:r>
+            <a:endParaRPr dirty="0"/>
+          </a:p>
+          <a:p>
+            <a:pPr marL="1371600" lvl="2" indent="-317500" algn="l" rtl="0">
+              <a:spcBef>
+                <a:spcPts val="0"/>
+              </a:spcBef>
+              <a:spcAft>
+                <a:spcPts val="0"/>
+              </a:spcAft>
+              <a:buSzPts val="1400"/>
+              <a:buChar char="■"/>
+            </a:pPr>
+            <a:r>
+              <a:rPr lang="en" dirty="0"/>
+              <a:t>array[ </a:t>
+            </a:r>
+            <a:r>
+              <a:rPr lang="en" i="1" dirty="0"/>
+              <a:t>"name" </a:t>
+            </a:r>
+            <a:r>
+              <a:rPr lang="en" dirty="0"/>
+              <a:t>] = value;    mem[ "steven" ] = 32</a:t>
+            </a:r>
+            <a:endParaRPr dirty="0"/>
+          </a:p>
+          <a:p>
+            <a:pPr marL="914400" lvl="1" indent="-317500" algn="l" rtl="0">
+              <a:spcBef>
+                <a:spcPts val="0"/>
+              </a:spcBef>
+              <a:spcAft>
+                <a:spcPts val="0"/>
+              </a:spcAft>
+              <a:buSzPts val="1400"/>
+              <a:buChar char="○"/>
+            </a:pPr>
+            <a:r>
+              <a:rPr lang="en" dirty="0"/>
+              <a:t>You use "name" to lookup the appropriate index</a:t>
+            </a:r>
+            <a:endParaRPr dirty="0"/>
+          </a:p>
+          <a:p>
+            <a:pPr marL="457200" lvl="0" indent="-342900" algn="l" rtl="0">
+              <a:spcBef>
+                <a:spcPts val="0"/>
+              </a:spcBef>
+              <a:spcAft>
+                <a:spcPts val="0"/>
+              </a:spcAft>
+              <a:buSzPts val="1800"/>
+              <a:buChar char="●"/>
+            </a:pPr>
+            <a:r>
+              <a:rPr lang="en" dirty="0"/>
+              <a:t>Consider the memory to the right</a:t>
+            </a:r>
+            <a:endParaRPr dirty="0"/>
+          </a:p>
+          <a:p>
+            <a:pPr marL="457200" lvl="0" indent="0" algn="l" rtl="0">
+              <a:spcBef>
+                <a:spcPts val="1200"/>
+              </a:spcBef>
+              <a:spcAft>
+                <a:spcPts val="0"/>
+              </a:spcAft>
+              <a:buNone/>
+            </a:pPr>
+            <a:endParaRPr dirty="0"/>
+          </a:p>
+          <a:p>
+            <a:pPr marL="457200" lvl="0" indent="-342900" algn="l" rtl="0">
+              <a:spcBef>
+                <a:spcPts val="1200"/>
+              </a:spcBef>
+              <a:spcAft>
+                <a:spcPts val="0"/>
+              </a:spcAft>
+              <a:buSzPts val="1800"/>
+              <a:buChar char="●"/>
+            </a:pPr>
+            <a:r>
+              <a:rPr lang="en" dirty="0"/>
+              <a:t>Update the </a:t>
+            </a:r>
+            <a:r>
+              <a:rPr lang="en" u="sng" dirty="0">
+                <a:solidFill>
+                  <a:schemeClr val="hlink"/>
+                </a:solidFill>
+                <a:hlinkClick r:id="rId3"/>
+              </a:rPr>
+              <a:t>memory</a:t>
+            </a:r>
+            <a:r>
+              <a:rPr lang="en" dirty="0"/>
+              <a:t> that I have created for this class</a:t>
+            </a:r>
+            <a:endParaRPr dirty="0"/>
+          </a:p>
+          <a:p>
+            <a:pPr marL="914400" lvl="1" indent="-317500" algn="l" rtl="0">
+              <a:spcBef>
+                <a:spcPts val="0"/>
+              </a:spcBef>
+              <a:spcAft>
+                <a:spcPts val="0"/>
+              </a:spcAft>
+              <a:buSzPts val="1400"/>
+              <a:buChar char="○"/>
+            </a:pPr>
+            <a:r>
+              <a:rPr lang="en" dirty="0"/>
+              <a:t>Find your name, update the associated value to be equal to your index.</a:t>
+            </a:r>
+            <a:endParaRPr dirty="0"/>
+          </a:p>
+          <a:p>
+            <a:pPr marL="914400" lvl="1" indent="-317500" algn="l" rtl="0">
+              <a:spcBef>
+                <a:spcPts val="0"/>
+              </a:spcBef>
+              <a:spcAft>
+                <a:spcPts val="0"/>
+              </a:spcAft>
+              <a:buSzPts val="1400"/>
+              <a:buChar char="○"/>
+            </a:pPr>
+            <a:r>
+              <a:rPr lang="en" dirty="0"/>
+              <a:t>That is to say, if your name is steven execute the following statement</a:t>
+            </a:r>
+            <a:endParaRPr dirty="0"/>
+          </a:p>
+          <a:p>
+            <a:pPr marL="1371600" lvl="2" indent="-317500" algn="l" rtl="0">
+              <a:spcBef>
+                <a:spcPts val="0"/>
+              </a:spcBef>
+              <a:spcAft>
+                <a:spcPts val="0"/>
+              </a:spcAft>
+              <a:buSzPts val="1400"/>
+              <a:buChar char="■"/>
+            </a:pPr>
+            <a:r>
+              <a:rPr lang="en" dirty="0"/>
+              <a:t>steven = &amp;steven;</a:t>
+            </a:r>
+            <a:endParaRPr dirty="0"/>
+          </a:p>
+        </p:txBody>
+      </p:sp>
+      <p:sp>
+        <p:nvSpPr>
+          <p:cNvPr id="238" name="Google Shape;238;p21"/>
+          <p:cNvSpPr/>
+          <p:nvPr/>
+        </p:nvSpPr>
+        <p:spPr>
+          <a:xfrm>
+            <a:off x="7315684" y="347796"/>
+            <a:ext cx="558900" cy="345600"/>
+          </a:xfrm>
+          <a:prstGeom prst="rect">
+            <a:avLst/>
+          </a:prstGeom>
+          <a:solidFill>
+            <a:schemeClr val="lt2"/>
+          </a:solidFill>
+          <a:ln w="9525" cap="flat" cmpd="sng">
+            <a:solidFill>
+              <a:schemeClr val="dk2"/>
+            </a:solidFill>
+            <a:prstDash val="solid"/>
+            <a:round/>
+            <a:headEnd type="none" w="sm" len="sm"/>
+            <a:tailEnd type="none" w="sm" len="sm"/>
+          </a:ln>
+        </p:spPr>
+        <p:txBody>
+          <a:bodyPr spcFirstLastPara="1" wrap="square" lIns="91425" tIns="91425" rIns="91425" bIns="91425" anchor="ctr" anchorCtr="0">
+            <a:noAutofit/>
+          </a:bodyPr>
+          <a:lstStyle/>
+          <a:p>
+            <a:pPr marL="0" lvl="0" indent="0" algn="l" rtl="0">
+              <a:spcBef>
+                <a:spcPts val="0"/>
+              </a:spcBef>
+              <a:spcAft>
+                <a:spcPts val="0"/>
+              </a:spcAft>
+              <a:buClr>
+                <a:schemeClr val="dk1"/>
+              </a:buClr>
+              <a:buSzPts val="1100"/>
+              <a:buFont typeface="Arial"/>
+              <a:buNone/>
+            </a:pPr>
+            <a:endParaRPr/>
+          </a:p>
+        </p:txBody>
+      </p:sp>
+      <p:sp>
+        <p:nvSpPr>
+          <p:cNvPr id="239" name="Google Shape;239;p21"/>
+          <p:cNvSpPr/>
+          <p:nvPr/>
+        </p:nvSpPr>
+        <p:spPr>
+          <a:xfrm>
+            <a:off x="7885725" y="347800"/>
+            <a:ext cx="1041300" cy="345600"/>
+          </a:xfrm>
+          <a:prstGeom prst="rect">
+            <a:avLst/>
+          </a:prstGeom>
+          <a:noFill/>
+          <a:ln>
+            <a:noFill/>
+          </a:ln>
+        </p:spPr>
+        <p:txBody>
+          <a:bodyPr spcFirstLastPara="1" wrap="square" lIns="91425" tIns="91425" rIns="91425" bIns="91425" anchor="ctr" anchorCtr="0">
+            <a:noAutofit/>
+          </a:bodyPr>
+          <a:lstStyle/>
+          <a:p>
+            <a:pPr marL="0" lvl="0" indent="0" algn="l" rtl="0">
+              <a:spcBef>
+                <a:spcPts val="0"/>
+              </a:spcBef>
+              <a:spcAft>
+                <a:spcPts val="0"/>
+              </a:spcAft>
+              <a:buNone/>
+            </a:pPr>
+            <a:r>
+              <a:rPr lang="en" sz="1000"/>
+              <a:t>0x8000 000A</a:t>
+            </a:r>
+            <a:endParaRPr sz="1000"/>
+          </a:p>
+        </p:txBody>
+      </p:sp>
+      <p:sp>
+        <p:nvSpPr>
+          <p:cNvPr id="240" name="Google Shape;240;p21"/>
+          <p:cNvSpPr/>
+          <p:nvPr/>
+        </p:nvSpPr>
+        <p:spPr>
+          <a:xfrm>
+            <a:off x="7315684" y="693408"/>
+            <a:ext cx="558900" cy="345600"/>
+          </a:xfrm>
+          <a:prstGeom prst="rect">
+            <a:avLst/>
+          </a:prstGeom>
+          <a:solidFill>
+            <a:schemeClr val="lt2"/>
+          </a:solidFill>
+          <a:ln w="9525" cap="flat" cmpd="sng">
+            <a:solidFill>
+              <a:schemeClr val="dk2"/>
+            </a:solidFill>
+            <a:prstDash val="solid"/>
+            <a:round/>
+            <a:headEnd type="none" w="sm" len="sm"/>
+            <a:tailEnd type="none" w="sm" len="sm"/>
+          </a:ln>
+        </p:spPr>
+        <p:txBody>
+          <a:bodyPr spcFirstLastPara="1" wrap="square" lIns="91425" tIns="91425" rIns="91425" bIns="91425" anchor="ctr" anchorCtr="0">
+            <a:noAutofit/>
+          </a:bodyPr>
+          <a:lstStyle/>
+          <a:p>
+            <a:pPr marL="0" lvl="0" indent="0" algn="ctr" rtl="0">
+              <a:spcBef>
+                <a:spcPts val="0"/>
+              </a:spcBef>
+              <a:spcAft>
+                <a:spcPts val="0"/>
+              </a:spcAft>
+              <a:buNone/>
+            </a:pPr>
+            <a:r>
+              <a:rPr lang="en"/>
+              <a:t>0</a:t>
+            </a:r>
+            <a:endParaRPr/>
+          </a:p>
+        </p:txBody>
+      </p:sp>
+      <p:sp>
+        <p:nvSpPr>
+          <p:cNvPr id="241" name="Google Shape;241;p21"/>
+          <p:cNvSpPr/>
+          <p:nvPr/>
+        </p:nvSpPr>
+        <p:spPr>
+          <a:xfrm>
+            <a:off x="7885725" y="688250"/>
+            <a:ext cx="1041300" cy="345600"/>
+          </a:xfrm>
+          <a:prstGeom prst="rect">
+            <a:avLst/>
+          </a:prstGeom>
+          <a:noFill/>
+          <a:ln>
+            <a:noFill/>
+          </a:ln>
+        </p:spPr>
+        <p:txBody>
+          <a:bodyPr spcFirstLastPara="1" wrap="square" lIns="91425" tIns="91425" rIns="91425" bIns="91425" anchor="ctr" anchorCtr="0">
+            <a:noAutofit/>
+          </a:bodyPr>
+          <a:lstStyle/>
+          <a:p>
+            <a:pPr marL="0" lvl="0" indent="0" algn="l" rtl="0">
+              <a:spcBef>
+                <a:spcPts val="0"/>
+              </a:spcBef>
+              <a:spcAft>
+                <a:spcPts val="0"/>
+              </a:spcAft>
+              <a:buNone/>
+            </a:pPr>
+            <a:r>
+              <a:rPr lang="en" sz="1000"/>
+              <a:t>0x8000 0009</a:t>
+            </a:r>
+            <a:endParaRPr sz="1000"/>
+          </a:p>
+        </p:txBody>
+      </p:sp>
+      <p:sp>
+        <p:nvSpPr>
+          <p:cNvPr id="242" name="Google Shape;242;p21"/>
+          <p:cNvSpPr/>
+          <p:nvPr/>
+        </p:nvSpPr>
+        <p:spPr>
+          <a:xfrm>
+            <a:off x="7315684" y="1038996"/>
+            <a:ext cx="558900" cy="345600"/>
+          </a:xfrm>
+          <a:prstGeom prst="rect">
+            <a:avLst/>
+          </a:prstGeom>
+          <a:solidFill>
+            <a:schemeClr val="lt2"/>
+          </a:solidFill>
+          <a:ln w="9525" cap="flat" cmpd="sng">
+            <a:solidFill>
+              <a:schemeClr val="dk2"/>
+            </a:solidFill>
+            <a:prstDash val="solid"/>
+            <a:round/>
+            <a:headEnd type="none" w="sm" len="sm"/>
+            <a:tailEnd type="none" w="sm" len="sm"/>
+          </a:ln>
+        </p:spPr>
+        <p:txBody>
+          <a:bodyPr spcFirstLastPara="1" wrap="square" lIns="91425" tIns="91425" rIns="91425" bIns="91425" anchor="ctr" anchorCtr="0">
+            <a:noAutofit/>
+          </a:bodyPr>
+          <a:lstStyle/>
+          <a:p>
+            <a:pPr marL="0" lvl="0" indent="0" algn="ctr" rtl="0">
+              <a:spcBef>
+                <a:spcPts val="0"/>
+              </a:spcBef>
+              <a:spcAft>
+                <a:spcPts val="0"/>
+              </a:spcAft>
+              <a:buNone/>
+            </a:pPr>
+            <a:r>
+              <a:rPr lang="en"/>
+              <a:t>3</a:t>
+            </a:r>
+            <a:endParaRPr/>
+          </a:p>
+        </p:txBody>
+      </p:sp>
+      <p:sp>
+        <p:nvSpPr>
+          <p:cNvPr id="243" name="Google Shape;243;p21"/>
+          <p:cNvSpPr/>
+          <p:nvPr/>
+        </p:nvSpPr>
+        <p:spPr>
+          <a:xfrm>
+            <a:off x="6496050" y="1039000"/>
+            <a:ext cx="819600" cy="345600"/>
+          </a:xfrm>
+          <a:prstGeom prst="rect">
+            <a:avLst/>
+          </a:prstGeom>
+          <a:noFill/>
+          <a:ln>
+            <a:noFill/>
+          </a:ln>
+        </p:spPr>
+        <p:txBody>
+          <a:bodyPr spcFirstLastPara="1" wrap="square" lIns="91425" tIns="91425" rIns="91425" bIns="91425" anchor="ctr" anchorCtr="0">
+            <a:noAutofit/>
+          </a:bodyPr>
+          <a:lstStyle/>
+          <a:p>
+            <a:pPr marL="0" lvl="0" indent="0" algn="r" rtl="0">
+              <a:spcBef>
+                <a:spcPts val="0"/>
+              </a:spcBef>
+              <a:spcAft>
+                <a:spcPts val="0"/>
+              </a:spcAft>
+              <a:buNone/>
+            </a:pPr>
+            <a:r>
+              <a:rPr lang="en" sz="1200"/>
+              <a:t>sasank:</a:t>
+            </a:r>
+            <a:endParaRPr sz="1200"/>
+          </a:p>
+        </p:txBody>
+      </p:sp>
+      <p:sp>
+        <p:nvSpPr>
+          <p:cNvPr id="244" name="Google Shape;244;p21"/>
+          <p:cNvSpPr/>
+          <p:nvPr/>
+        </p:nvSpPr>
+        <p:spPr>
+          <a:xfrm>
+            <a:off x="7885725" y="1028700"/>
+            <a:ext cx="1041300" cy="345600"/>
+          </a:xfrm>
+          <a:prstGeom prst="rect">
+            <a:avLst/>
+          </a:prstGeom>
+          <a:noFill/>
+          <a:ln>
+            <a:noFill/>
+          </a:ln>
+        </p:spPr>
+        <p:txBody>
+          <a:bodyPr spcFirstLastPara="1" wrap="square" lIns="91425" tIns="91425" rIns="91425" bIns="91425" anchor="ctr" anchorCtr="0">
+            <a:noAutofit/>
+          </a:bodyPr>
+          <a:lstStyle/>
+          <a:p>
+            <a:pPr marL="0" lvl="0" indent="0" algn="l" rtl="0">
+              <a:spcBef>
+                <a:spcPts val="0"/>
+              </a:spcBef>
+              <a:spcAft>
+                <a:spcPts val="0"/>
+              </a:spcAft>
+              <a:buNone/>
+            </a:pPr>
+            <a:r>
+              <a:rPr lang="en" sz="1000"/>
+              <a:t>0x8000 0008</a:t>
+            </a:r>
+            <a:endParaRPr sz="1000"/>
+          </a:p>
+        </p:txBody>
+      </p:sp>
+      <p:sp>
+        <p:nvSpPr>
+          <p:cNvPr id="245" name="Google Shape;245;p21"/>
+          <p:cNvSpPr/>
+          <p:nvPr/>
+        </p:nvSpPr>
+        <p:spPr>
+          <a:xfrm>
+            <a:off x="7315684" y="1384608"/>
+            <a:ext cx="558900" cy="345600"/>
+          </a:xfrm>
+          <a:prstGeom prst="rect">
+            <a:avLst/>
+          </a:prstGeom>
+          <a:solidFill>
+            <a:schemeClr val="lt2"/>
+          </a:solidFill>
+          <a:ln w="9525" cap="flat" cmpd="sng">
+            <a:solidFill>
+              <a:schemeClr val="dk2"/>
+            </a:solidFill>
+            <a:prstDash val="solid"/>
+            <a:round/>
+            <a:headEnd type="none" w="sm" len="sm"/>
+            <a:tailEnd type="none" w="sm" len="sm"/>
+          </a:ln>
+        </p:spPr>
+        <p:txBody>
+          <a:bodyPr spcFirstLastPara="1" wrap="square" lIns="91425" tIns="91425" rIns="91425" bIns="91425" anchor="ctr" anchorCtr="0">
+            <a:noAutofit/>
+          </a:bodyPr>
+          <a:lstStyle/>
+          <a:p>
+            <a:pPr marL="0" lvl="0" indent="0" algn="ctr" rtl="0">
+              <a:spcBef>
+                <a:spcPts val="0"/>
+              </a:spcBef>
+              <a:spcAft>
+                <a:spcPts val="0"/>
+              </a:spcAft>
+              <a:buNone/>
+            </a:pPr>
+            <a:r>
+              <a:rPr lang="en"/>
+              <a:t>0</a:t>
+            </a:r>
+            <a:endParaRPr/>
+          </a:p>
+        </p:txBody>
+      </p:sp>
+      <p:sp>
+        <p:nvSpPr>
+          <p:cNvPr id="246" name="Google Shape;246;p21"/>
+          <p:cNvSpPr/>
+          <p:nvPr/>
+        </p:nvSpPr>
+        <p:spPr>
+          <a:xfrm>
+            <a:off x="7885725" y="1369150"/>
+            <a:ext cx="1041300" cy="345600"/>
+          </a:xfrm>
+          <a:prstGeom prst="rect">
+            <a:avLst/>
+          </a:prstGeom>
+          <a:noFill/>
+          <a:ln>
+            <a:noFill/>
+          </a:ln>
+        </p:spPr>
+        <p:txBody>
+          <a:bodyPr spcFirstLastPara="1" wrap="square" lIns="91425" tIns="91425" rIns="91425" bIns="91425" anchor="ctr" anchorCtr="0">
+            <a:noAutofit/>
+          </a:bodyPr>
+          <a:lstStyle/>
+          <a:p>
+            <a:pPr marL="0" lvl="0" indent="0" algn="l" rtl="0">
+              <a:spcBef>
+                <a:spcPts val="0"/>
+              </a:spcBef>
+              <a:spcAft>
+                <a:spcPts val="0"/>
+              </a:spcAft>
+              <a:buNone/>
+            </a:pPr>
+            <a:r>
+              <a:rPr lang="en" sz="1000"/>
+              <a:t>0x8000 0007</a:t>
+            </a:r>
+            <a:endParaRPr sz="1000"/>
+          </a:p>
+        </p:txBody>
+      </p:sp>
+      <p:sp>
+        <p:nvSpPr>
+          <p:cNvPr id="247" name="Google Shape;247;p21"/>
+          <p:cNvSpPr/>
+          <p:nvPr/>
+        </p:nvSpPr>
+        <p:spPr>
+          <a:xfrm>
+            <a:off x="7315684" y="1730196"/>
+            <a:ext cx="558900" cy="345600"/>
+          </a:xfrm>
+          <a:prstGeom prst="rect">
+            <a:avLst/>
+          </a:prstGeom>
+          <a:solidFill>
+            <a:schemeClr val="lt2"/>
+          </a:solidFill>
+          <a:ln w="9525" cap="flat" cmpd="sng">
+            <a:solidFill>
+              <a:schemeClr val="dk2"/>
+            </a:solidFill>
+            <a:prstDash val="solid"/>
+            <a:round/>
+            <a:headEnd type="none" w="sm" len="sm"/>
+            <a:tailEnd type="none" w="sm" len="sm"/>
+          </a:ln>
+        </p:spPr>
+        <p:txBody>
+          <a:bodyPr spcFirstLastPara="1" wrap="square" lIns="91425" tIns="91425" rIns="91425" bIns="91425" anchor="ctr" anchorCtr="0">
+            <a:noAutofit/>
+          </a:bodyPr>
+          <a:lstStyle/>
+          <a:p>
+            <a:pPr marL="0" lvl="0" indent="0" algn="ctr" rtl="0">
+              <a:spcBef>
+                <a:spcPts val="0"/>
+              </a:spcBef>
+              <a:spcAft>
+                <a:spcPts val="0"/>
+              </a:spcAft>
+              <a:buNone/>
+            </a:pPr>
+            <a:r>
+              <a:rPr lang="en"/>
+              <a:t>37</a:t>
+            </a:r>
+            <a:endParaRPr/>
+          </a:p>
+        </p:txBody>
+      </p:sp>
+      <p:sp>
+        <p:nvSpPr>
+          <p:cNvPr id="248" name="Google Shape;248;p21"/>
+          <p:cNvSpPr/>
+          <p:nvPr/>
+        </p:nvSpPr>
+        <p:spPr>
+          <a:xfrm>
+            <a:off x="6666450" y="1730199"/>
+            <a:ext cx="649200" cy="345600"/>
+          </a:xfrm>
+          <a:prstGeom prst="rect">
+            <a:avLst/>
+          </a:prstGeom>
+          <a:noFill/>
+          <a:ln>
+            <a:noFill/>
+          </a:ln>
+        </p:spPr>
+        <p:txBody>
+          <a:bodyPr spcFirstLastPara="1" wrap="square" lIns="91425" tIns="91425" rIns="91425" bIns="91425" anchor="ctr" anchorCtr="0">
+            <a:noAutofit/>
+          </a:bodyPr>
+          <a:lstStyle/>
+          <a:p>
+            <a:pPr marL="0" lvl="0" indent="0" algn="r" rtl="0">
+              <a:spcBef>
+                <a:spcPts val="0"/>
+              </a:spcBef>
+              <a:spcAft>
+                <a:spcPts val="0"/>
+              </a:spcAft>
+              <a:buNone/>
+            </a:pPr>
+            <a:r>
+              <a:rPr lang="en" sz="1200"/>
+              <a:t>shant:</a:t>
+            </a:r>
+            <a:endParaRPr sz="1200"/>
+          </a:p>
+        </p:txBody>
+      </p:sp>
+      <p:sp>
+        <p:nvSpPr>
+          <p:cNvPr id="249" name="Google Shape;249;p21"/>
+          <p:cNvSpPr/>
+          <p:nvPr/>
+        </p:nvSpPr>
+        <p:spPr>
+          <a:xfrm>
+            <a:off x="7885725" y="1709600"/>
+            <a:ext cx="1041300" cy="345600"/>
+          </a:xfrm>
+          <a:prstGeom prst="rect">
+            <a:avLst/>
+          </a:prstGeom>
+          <a:noFill/>
+          <a:ln>
+            <a:noFill/>
+          </a:ln>
+        </p:spPr>
+        <p:txBody>
+          <a:bodyPr spcFirstLastPara="1" wrap="square" lIns="91425" tIns="91425" rIns="91425" bIns="91425" anchor="ctr" anchorCtr="0">
+            <a:noAutofit/>
+          </a:bodyPr>
+          <a:lstStyle/>
+          <a:p>
+            <a:pPr marL="0" lvl="0" indent="0" algn="l" rtl="0">
+              <a:spcBef>
+                <a:spcPts val="0"/>
+              </a:spcBef>
+              <a:spcAft>
+                <a:spcPts val="0"/>
+              </a:spcAft>
+              <a:buNone/>
+            </a:pPr>
+            <a:r>
+              <a:rPr lang="en" sz="1000"/>
+              <a:t>0x8000 0006</a:t>
+            </a:r>
+            <a:endParaRPr sz="1000"/>
+          </a:p>
+        </p:txBody>
+      </p:sp>
+      <p:sp>
+        <p:nvSpPr>
+          <p:cNvPr id="250" name="Google Shape;250;p21"/>
+          <p:cNvSpPr/>
+          <p:nvPr/>
+        </p:nvSpPr>
+        <p:spPr>
+          <a:xfrm>
+            <a:off x="7315684" y="2075808"/>
+            <a:ext cx="558900" cy="345600"/>
+          </a:xfrm>
+          <a:prstGeom prst="rect">
+            <a:avLst/>
+          </a:prstGeom>
+          <a:solidFill>
+            <a:schemeClr val="lt2"/>
+          </a:solidFill>
+          <a:ln w="9525" cap="flat" cmpd="sng">
+            <a:solidFill>
+              <a:schemeClr val="dk2"/>
+            </a:solidFill>
+            <a:prstDash val="solid"/>
+            <a:round/>
+            <a:headEnd type="none" w="sm" len="sm"/>
+            <a:tailEnd type="none" w="sm" len="sm"/>
+          </a:ln>
+        </p:spPr>
+        <p:txBody>
+          <a:bodyPr spcFirstLastPara="1" wrap="square" lIns="91425" tIns="91425" rIns="91425" bIns="91425" anchor="ctr" anchorCtr="0">
+            <a:noAutofit/>
+          </a:bodyPr>
+          <a:lstStyle/>
+          <a:p>
+            <a:pPr marL="0" lvl="0" indent="0" algn="ctr" rtl="0">
+              <a:spcBef>
+                <a:spcPts val="0"/>
+              </a:spcBef>
+              <a:spcAft>
+                <a:spcPts val="0"/>
+              </a:spcAft>
+              <a:buNone/>
+            </a:pPr>
+            <a:endParaRPr/>
+          </a:p>
+        </p:txBody>
+      </p:sp>
+      <p:sp>
+        <p:nvSpPr>
+          <p:cNvPr id="251" name="Google Shape;251;p21"/>
+          <p:cNvSpPr/>
+          <p:nvPr/>
+        </p:nvSpPr>
+        <p:spPr>
+          <a:xfrm>
+            <a:off x="7885725" y="2050050"/>
+            <a:ext cx="1041300" cy="345600"/>
+          </a:xfrm>
+          <a:prstGeom prst="rect">
+            <a:avLst/>
+          </a:prstGeom>
+          <a:noFill/>
+          <a:ln>
+            <a:noFill/>
+          </a:ln>
+        </p:spPr>
+        <p:txBody>
+          <a:bodyPr spcFirstLastPara="1" wrap="square" lIns="91425" tIns="91425" rIns="91425" bIns="91425" anchor="ctr" anchorCtr="0">
+            <a:noAutofit/>
+          </a:bodyPr>
+          <a:lstStyle/>
+          <a:p>
+            <a:pPr marL="0" lvl="0" indent="0" algn="l" rtl="0">
+              <a:spcBef>
+                <a:spcPts val="0"/>
+              </a:spcBef>
+              <a:spcAft>
+                <a:spcPts val="0"/>
+              </a:spcAft>
+              <a:buNone/>
+            </a:pPr>
+            <a:r>
+              <a:rPr lang="en" sz="1000"/>
+              <a:t>0x8000 0005</a:t>
+            </a:r>
+            <a:endParaRPr sz="1000"/>
+          </a:p>
+        </p:txBody>
+      </p:sp>
+      <p:sp>
+        <p:nvSpPr>
+          <p:cNvPr id="252" name="Google Shape;252;p21"/>
+          <p:cNvSpPr/>
+          <p:nvPr/>
+        </p:nvSpPr>
+        <p:spPr>
+          <a:xfrm>
+            <a:off x="7315684" y="2421396"/>
+            <a:ext cx="558900" cy="345600"/>
+          </a:xfrm>
+          <a:prstGeom prst="rect">
+            <a:avLst/>
+          </a:prstGeom>
+          <a:solidFill>
+            <a:schemeClr val="lt2"/>
+          </a:solidFill>
+          <a:ln w="9525" cap="flat" cmpd="sng">
+            <a:solidFill>
+              <a:schemeClr val="dk2"/>
+            </a:solidFill>
+            <a:prstDash val="solid"/>
+            <a:round/>
+            <a:headEnd type="none" w="sm" len="sm"/>
+            <a:tailEnd type="none" w="sm" len="sm"/>
+          </a:ln>
+        </p:spPr>
+        <p:txBody>
+          <a:bodyPr spcFirstLastPara="1" wrap="square" lIns="91425" tIns="91425" rIns="91425" bIns="91425" anchor="ctr" anchorCtr="0">
+            <a:noAutofit/>
+          </a:bodyPr>
+          <a:lstStyle/>
+          <a:p>
+            <a:pPr marL="0" lvl="0" indent="0" algn="ctr" rtl="0">
+              <a:spcBef>
+                <a:spcPts val="0"/>
+              </a:spcBef>
+              <a:spcAft>
+                <a:spcPts val="0"/>
+              </a:spcAft>
+              <a:buClr>
+                <a:schemeClr val="dk1"/>
+              </a:buClr>
+              <a:buSzPts val="1100"/>
+              <a:buFont typeface="Arial"/>
+              <a:buNone/>
+            </a:pPr>
+            <a:r>
+              <a:rPr lang="en" sz="1300">
+                <a:solidFill>
+                  <a:schemeClr val="dk1"/>
+                </a:solidFill>
+              </a:rPr>
+              <a:t>32</a:t>
+            </a:r>
+            <a:endParaRPr sz="1300"/>
+          </a:p>
+        </p:txBody>
+      </p:sp>
+      <p:sp>
+        <p:nvSpPr>
+          <p:cNvPr id="253" name="Google Shape;253;p21"/>
+          <p:cNvSpPr/>
+          <p:nvPr/>
+        </p:nvSpPr>
+        <p:spPr>
+          <a:xfrm>
+            <a:off x="6325950" y="2421402"/>
+            <a:ext cx="989700" cy="345600"/>
+          </a:xfrm>
+          <a:prstGeom prst="rect">
+            <a:avLst/>
+          </a:prstGeom>
+          <a:noFill/>
+          <a:ln>
+            <a:noFill/>
+          </a:ln>
+        </p:spPr>
+        <p:txBody>
+          <a:bodyPr spcFirstLastPara="1" wrap="square" lIns="91425" tIns="91425" rIns="91425" bIns="91425" anchor="ctr" anchorCtr="0">
+            <a:noAutofit/>
+          </a:bodyPr>
+          <a:lstStyle/>
+          <a:p>
+            <a:pPr marL="0" lvl="0" indent="0" algn="r" rtl="0">
+              <a:spcBef>
+                <a:spcPts val="0"/>
+              </a:spcBef>
+              <a:spcAft>
+                <a:spcPts val="0"/>
+              </a:spcAft>
+              <a:buNone/>
+            </a:pPr>
+            <a:r>
+              <a:rPr lang="en" sz="1200"/>
+              <a:t>steven:</a:t>
+            </a:r>
+            <a:endParaRPr sz="1200"/>
+          </a:p>
+        </p:txBody>
+      </p:sp>
+      <p:sp>
+        <p:nvSpPr>
+          <p:cNvPr id="254" name="Google Shape;254;p21"/>
+          <p:cNvSpPr/>
+          <p:nvPr/>
+        </p:nvSpPr>
+        <p:spPr>
+          <a:xfrm>
+            <a:off x="7874575" y="2390500"/>
+            <a:ext cx="1041300" cy="345600"/>
+          </a:xfrm>
+          <a:prstGeom prst="rect">
+            <a:avLst/>
+          </a:prstGeom>
+          <a:noFill/>
+          <a:ln>
+            <a:noFill/>
+          </a:ln>
+        </p:spPr>
+        <p:txBody>
+          <a:bodyPr spcFirstLastPara="1" wrap="square" lIns="91425" tIns="91425" rIns="91425" bIns="91425" anchor="ctr" anchorCtr="0">
+            <a:noAutofit/>
+          </a:bodyPr>
+          <a:lstStyle/>
+          <a:p>
+            <a:pPr marL="0" lvl="0" indent="0" algn="l" rtl="0">
+              <a:spcBef>
+                <a:spcPts val="0"/>
+              </a:spcBef>
+              <a:spcAft>
+                <a:spcPts val="0"/>
+              </a:spcAft>
+              <a:buNone/>
+            </a:pPr>
+            <a:r>
+              <a:rPr lang="en" sz="1000"/>
+              <a:t>0x8000 0004</a:t>
+            </a:r>
+            <a:endParaRPr sz="1000"/>
+          </a:p>
+        </p:txBody>
+      </p:sp>
+      <p:sp>
+        <p:nvSpPr>
+          <p:cNvPr id="255" name="Google Shape;255;p21"/>
+          <p:cNvSpPr/>
+          <p:nvPr/>
+        </p:nvSpPr>
+        <p:spPr>
+          <a:xfrm>
+            <a:off x="7315684" y="2715508"/>
+            <a:ext cx="558900" cy="345600"/>
+          </a:xfrm>
+          <a:prstGeom prst="rect">
+            <a:avLst/>
+          </a:prstGeom>
+          <a:solidFill>
+            <a:schemeClr val="lt2"/>
+          </a:solidFill>
+          <a:ln w="9525" cap="flat" cmpd="sng">
+            <a:solidFill>
+              <a:schemeClr val="dk2"/>
+            </a:solidFill>
+            <a:prstDash val="solid"/>
+            <a:round/>
+            <a:headEnd type="none" w="sm" len="sm"/>
+            <a:tailEnd type="none" w="sm" len="sm"/>
+          </a:ln>
+        </p:spPr>
+        <p:txBody>
+          <a:bodyPr spcFirstLastPara="1" wrap="square" lIns="91425" tIns="91425" rIns="91425" bIns="91425" anchor="ctr" anchorCtr="0">
+            <a:noAutofit/>
+          </a:bodyPr>
+          <a:lstStyle/>
+          <a:p>
+            <a:pPr marL="0" lvl="0" indent="0" algn="ctr" rtl="0">
+              <a:spcBef>
+                <a:spcPts val="0"/>
+              </a:spcBef>
+              <a:spcAft>
+                <a:spcPts val="0"/>
+              </a:spcAft>
+              <a:buNone/>
+            </a:pPr>
+            <a:r>
+              <a:rPr lang="en"/>
+              <a:t>?</a:t>
+            </a:r>
+            <a:endParaRPr/>
+          </a:p>
+        </p:txBody>
+      </p:sp>
+      <p:sp>
+        <p:nvSpPr>
+          <p:cNvPr id="256" name="Google Shape;256;p21"/>
+          <p:cNvSpPr/>
+          <p:nvPr/>
+        </p:nvSpPr>
+        <p:spPr>
+          <a:xfrm>
+            <a:off x="6430350" y="2715502"/>
+            <a:ext cx="885300" cy="345600"/>
+          </a:xfrm>
+          <a:prstGeom prst="rect">
+            <a:avLst/>
+          </a:prstGeom>
+          <a:noFill/>
+          <a:ln>
+            <a:noFill/>
+          </a:ln>
+        </p:spPr>
+        <p:txBody>
+          <a:bodyPr spcFirstLastPara="1" wrap="square" lIns="91425" tIns="91425" rIns="91425" bIns="91425" anchor="ctr" anchorCtr="0">
+            <a:noAutofit/>
+          </a:bodyPr>
+          <a:lstStyle/>
+          <a:p>
+            <a:pPr marL="0" lvl="0" indent="0" algn="r" rtl="0">
+              <a:spcBef>
+                <a:spcPts val="0"/>
+              </a:spcBef>
+              <a:spcAft>
+                <a:spcPts val="0"/>
+              </a:spcAft>
+              <a:buNone/>
+            </a:pPr>
+            <a:r>
+              <a:rPr lang="en" sz="1200"/>
+              <a:t>syndey:</a:t>
+            </a:r>
+            <a:endParaRPr sz="1200"/>
+          </a:p>
+        </p:txBody>
+      </p:sp>
+      <p:sp>
+        <p:nvSpPr>
+          <p:cNvPr id="257" name="Google Shape;257;p21"/>
+          <p:cNvSpPr/>
+          <p:nvPr/>
+        </p:nvSpPr>
+        <p:spPr>
+          <a:xfrm>
+            <a:off x="7885725" y="2730950"/>
+            <a:ext cx="1041300" cy="345600"/>
+          </a:xfrm>
+          <a:prstGeom prst="rect">
+            <a:avLst/>
+          </a:prstGeom>
+          <a:noFill/>
+          <a:ln>
+            <a:noFill/>
+          </a:ln>
+        </p:spPr>
+        <p:txBody>
+          <a:bodyPr spcFirstLastPara="1" wrap="square" lIns="91425" tIns="91425" rIns="91425" bIns="91425" anchor="ctr" anchorCtr="0">
+            <a:noAutofit/>
+          </a:bodyPr>
+          <a:lstStyle/>
+          <a:p>
+            <a:pPr marL="0" lvl="0" indent="0" algn="l" rtl="0">
+              <a:spcBef>
+                <a:spcPts val="0"/>
+              </a:spcBef>
+              <a:spcAft>
+                <a:spcPts val="0"/>
+              </a:spcAft>
+              <a:buNone/>
+            </a:pPr>
+            <a:r>
+              <a:rPr lang="en" sz="1000"/>
+              <a:t>0x8000 0003</a:t>
+            </a:r>
+            <a:endParaRPr sz="1000"/>
+          </a:p>
+        </p:txBody>
+      </p:sp>
+      <p:sp>
+        <p:nvSpPr>
+          <p:cNvPr id="258" name="Google Shape;258;p21"/>
+          <p:cNvSpPr/>
+          <p:nvPr/>
+        </p:nvSpPr>
+        <p:spPr>
+          <a:xfrm>
+            <a:off x="7315684" y="3061096"/>
+            <a:ext cx="558900" cy="345600"/>
+          </a:xfrm>
+          <a:prstGeom prst="rect">
+            <a:avLst/>
+          </a:prstGeom>
+          <a:solidFill>
+            <a:schemeClr val="lt2"/>
+          </a:solidFill>
+          <a:ln w="9525" cap="flat" cmpd="sng">
+            <a:solidFill>
+              <a:schemeClr val="dk2"/>
+            </a:solidFill>
+            <a:prstDash val="solid"/>
+            <a:round/>
+            <a:headEnd type="none" w="sm" len="sm"/>
+            <a:tailEnd type="none" w="sm" len="sm"/>
+          </a:ln>
+        </p:spPr>
+        <p:txBody>
+          <a:bodyPr spcFirstLastPara="1" wrap="square" lIns="91425" tIns="91425" rIns="91425" bIns="91425" anchor="ctr" anchorCtr="0">
+            <a:noAutofit/>
+          </a:bodyPr>
+          <a:lstStyle/>
+          <a:p>
+            <a:pPr marL="0" lvl="0" indent="0" algn="ctr" rtl="0">
+              <a:spcBef>
+                <a:spcPts val="0"/>
+              </a:spcBef>
+              <a:spcAft>
+                <a:spcPts val="0"/>
+              </a:spcAft>
+              <a:buNone/>
+            </a:pPr>
+            <a:r>
+              <a:rPr lang="en"/>
+              <a:t>45</a:t>
+            </a:r>
+            <a:endParaRPr/>
+          </a:p>
+        </p:txBody>
+      </p:sp>
+      <p:sp>
+        <p:nvSpPr>
+          <p:cNvPr id="259" name="Google Shape;259;p21"/>
+          <p:cNvSpPr/>
+          <p:nvPr/>
+        </p:nvSpPr>
+        <p:spPr>
+          <a:xfrm>
+            <a:off x="7885725" y="3071400"/>
+            <a:ext cx="1041300" cy="345600"/>
+          </a:xfrm>
+          <a:prstGeom prst="rect">
+            <a:avLst/>
+          </a:prstGeom>
+          <a:noFill/>
+          <a:ln>
+            <a:noFill/>
+          </a:ln>
+        </p:spPr>
+        <p:txBody>
+          <a:bodyPr spcFirstLastPara="1" wrap="square" lIns="91425" tIns="91425" rIns="91425" bIns="91425" anchor="ctr" anchorCtr="0">
+            <a:noAutofit/>
+          </a:bodyPr>
+          <a:lstStyle/>
+          <a:p>
+            <a:pPr marL="0" lvl="0" indent="0" algn="l" rtl="0">
+              <a:spcBef>
+                <a:spcPts val="0"/>
+              </a:spcBef>
+              <a:spcAft>
+                <a:spcPts val="0"/>
+              </a:spcAft>
+              <a:buNone/>
+            </a:pPr>
+            <a:r>
+              <a:rPr lang="en" sz="1000"/>
+              <a:t>0x8000 0002</a:t>
+            </a:r>
+            <a:endParaRPr sz="1000"/>
+          </a:p>
+        </p:txBody>
+      </p:sp>
+      <p:sp>
+        <p:nvSpPr>
+          <p:cNvPr id="260" name="Google Shape;260;p21"/>
+          <p:cNvSpPr/>
+          <p:nvPr/>
+        </p:nvSpPr>
+        <p:spPr>
+          <a:xfrm>
+            <a:off x="7315684" y="3406708"/>
+            <a:ext cx="558900" cy="345600"/>
+          </a:xfrm>
+          <a:prstGeom prst="rect">
+            <a:avLst/>
+          </a:prstGeom>
+          <a:solidFill>
+            <a:schemeClr val="lt2"/>
+          </a:solidFill>
+          <a:ln w="9525" cap="flat" cmpd="sng">
+            <a:solidFill>
+              <a:schemeClr val="dk2"/>
+            </a:solidFill>
+            <a:prstDash val="solid"/>
+            <a:round/>
+            <a:headEnd type="none" w="sm" len="sm"/>
+            <a:tailEnd type="none" w="sm" len="sm"/>
+          </a:ln>
+        </p:spPr>
+        <p:txBody>
+          <a:bodyPr spcFirstLastPara="1" wrap="square" lIns="91425" tIns="91425" rIns="91425" bIns="91425" anchor="ctr" anchorCtr="0">
+            <a:noAutofit/>
+          </a:bodyPr>
+          <a:lstStyle/>
+          <a:p>
+            <a:pPr marL="0" lvl="0" indent="0" algn="ctr" rtl="0">
+              <a:spcBef>
+                <a:spcPts val="0"/>
+              </a:spcBef>
+              <a:spcAft>
+                <a:spcPts val="0"/>
+              </a:spcAft>
+              <a:buNone/>
+            </a:pPr>
+            <a:r>
+              <a:rPr lang="en"/>
+              <a:t>1</a:t>
+            </a:r>
+            <a:endParaRPr/>
+          </a:p>
+        </p:txBody>
+      </p:sp>
+      <p:sp>
+        <p:nvSpPr>
+          <p:cNvPr id="261" name="Google Shape;261;p21"/>
+          <p:cNvSpPr/>
+          <p:nvPr/>
+        </p:nvSpPr>
+        <p:spPr>
+          <a:xfrm>
+            <a:off x="6666450" y="3406701"/>
+            <a:ext cx="649200" cy="345600"/>
+          </a:xfrm>
+          <a:prstGeom prst="rect">
+            <a:avLst/>
+          </a:prstGeom>
+          <a:noFill/>
+          <a:ln>
+            <a:noFill/>
+          </a:ln>
+        </p:spPr>
+        <p:txBody>
+          <a:bodyPr spcFirstLastPara="1" wrap="square" lIns="91425" tIns="91425" rIns="91425" bIns="91425" anchor="ctr" anchorCtr="0">
+            <a:noAutofit/>
+          </a:bodyPr>
+          <a:lstStyle/>
+          <a:p>
+            <a:pPr marL="0" lvl="0" indent="0" algn="r" rtl="0">
+              <a:spcBef>
+                <a:spcPts val="0"/>
+              </a:spcBef>
+              <a:spcAft>
+                <a:spcPts val="0"/>
+              </a:spcAft>
+              <a:buNone/>
+            </a:pPr>
+            <a:r>
+              <a:rPr lang="en" sz="1200"/>
+              <a:t>tyler:</a:t>
+            </a:r>
+            <a:endParaRPr sz="1200"/>
+          </a:p>
+        </p:txBody>
+      </p:sp>
+      <p:sp>
+        <p:nvSpPr>
+          <p:cNvPr id="262" name="Google Shape;262;p21"/>
+          <p:cNvSpPr/>
+          <p:nvPr/>
+        </p:nvSpPr>
+        <p:spPr>
+          <a:xfrm>
+            <a:off x="7885725" y="3411850"/>
+            <a:ext cx="1041300" cy="345600"/>
+          </a:xfrm>
+          <a:prstGeom prst="rect">
+            <a:avLst/>
+          </a:prstGeom>
+          <a:noFill/>
+          <a:ln>
+            <a:noFill/>
+          </a:ln>
+        </p:spPr>
+        <p:txBody>
+          <a:bodyPr spcFirstLastPara="1" wrap="square" lIns="91425" tIns="91425" rIns="91425" bIns="91425" anchor="ctr" anchorCtr="0">
+            <a:noAutofit/>
+          </a:bodyPr>
+          <a:lstStyle/>
+          <a:p>
+            <a:pPr marL="0" lvl="0" indent="0" algn="l" rtl="0">
+              <a:spcBef>
+                <a:spcPts val="0"/>
+              </a:spcBef>
+              <a:spcAft>
+                <a:spcPts val="0"/>
+              </a:spcAft>
+              <a:buNone/>
+            </a:pPr>
+            <a:r>
+              <a:rPr lang="en" sz="1000"/>
+              <a:t>0x8000 0001</a:t>
+            </a:r>
+            <a:endParaRPr sz="1000"/>
+          </a:p>
+        </p:txBody>
+      </p:sp>
+      <p:sp>
+        <p:nvSpPr>
+          <p:cNvPr id="263" name="Google Shape;263;p21"/>
+          <p:cNvSpPr/>
+          <p:nvPr/>
+        </p:nvSpPr>
+        <p:spPr>
+          <a:xfrm>
+            <a:off x="7315684" y="3752296"/>
+            <a:ext cx="558900" cy="345600"/>
+          </a:xfrm>
+          <a:prstGeom prst="rect">
+            <a:avLst/>
+          </a:prstGeom>
+          <a:solidFill>
+            <a:schemeClr val="lt2"/>
+          </a:solidFill>
+          <a:ln w="9525" cap="flat" cmpd="sng">
+            <a:solidFill>
+              <a:schemeClr val="dk2"/>
+            </a:solidFill>
+            <a:prstDash val="solid"/>
+            <a:round/>
+            <a:headEnd type="none" w="sm" len="sm"/>
+            <a:tailEnd type="none" w="sm" len="sm"/>
+          </a:ln>
+        </p:spPr>
+        <p:txBody>
+          <a:bodyPr spcFirstLastPara="1" wrap="square" lIns="91425" tIns="91425" rIns="91425" bIns="91425" anchor="ctr" anchorCtr="0">
+            <a:noAutofit/>
+          </a:bodyPr>
+          <a:lstStyle/>
+          <a:p>
+            <a:pPr marL="0" lvl="0" indent="0" algn="ctr" rtl="0">
+              <a:spcBef>
+                <a:spcPts val="0"/>
+              </a:spcBef>
+              <a:spcAft>
+                <a:spcPts val="0"/>
+              </a:spcAft>
+              <a:buNone/>
+            </a:pPr>
+            <a:r>
+              <a:rPr lang="en"/>
+              <a:t>0</a:t>
+            </a:r>
+            <a:endParaRPr/>
+          </a:p>
+        </p:txBody>
+      </p:sp>
+      <p:sp>
+        <p:nvSpPr>
+          <p:cNvPr id="264" name="Google Shape;264;p21"/>
+          <p:cNvSpPr/>
+          <p:nvPr/>
+        </p:nvSpPr>
+        <p:spPr>
+          <a:xfrm>
+            <a:off x="7885725" y="3752300"/>
+            <a:ext cx="1041300" cy="345600"/>
+          </a:xfrm>
+          <a:prstGeom prst="rect">
+            <a:avLst/>
+          </a:prstGeom>
+          <a:noFill/>
+          <a:ln>
+            <a:noFill/>
+          </a:ln>
+        </p:spPr>
+        <p:txBody>
+          <a:bodyPr spcFirstLastPara="1" wrap="square" lIns="91425" tIns="91425" rIns="91425" bIns="91425" anchor="ctr" anchorCtr="0">
+            <a:noAutofit/>
+          </a:bodyPr>
+          <a:lstStyle/>
+          <a:p>
+            <a:pPr marL="0" lvl="0" indent="0" algn="l" rtl="0">
+              <a:spcBef>
+                <a:spcPts val="0"/>
+              </a:spcBef>
+              <a:spcAft>
+                <a:spcPts val="0"/>
+              </a:spcAft>
+              <a:buNone/>
+            </a:pPr>
+            <a:r>
+              <a:rPr lang="en" sz="1000"/>
+              <a:t>0x8000 0000</a:t>
+            </a:r>
+            <a:endParaRPr sz="1000"/>
+          </a:p>
+        </p:txBody>
+      </p:sp>
+    </p:spTree>
+  </p:cSld>
+  <p:clrMapOvr>
+    <a:masterClrMapping/>
+  </p:clrMapOvr>
+</p:sld>
+</file>
+
+<file path=ppt/slides/slide11.xml><?xml version="1.0" encoding="utf-8"?>
+<p:sld xmlns:a="http://schemas.openxmlformats.org/drawingml/2006/main" xmlns:r="http://schemas.openxmlformats.org/officeDocument/2006/relationships" xmlns:p="http://schemas.openxmlformats.org/presentationml/2006/main">
+  <p:cSld>
+    <p:spTree>
+      <p:nvGrpSpPr>
         <p:cNvPr id="1" name="Shape 268"/>
         <p:cNvGrpSpPr/>
         <p:nvPr/>
@@ -11395,6 +13074,977 @@
   <p:cSld>
     <p:spTree>
       <p:nvGrpSpPr>
+        <p:cNvPr id="1" name="Shape 232"/>
+        <p:cNvGrpSpPr/>
+        <p:nvPr/>
+      </p:nvGrpSpPr>
+      <p:grpSpPr>
+        <a:xfrm>
+          <a:off x="0" y="0"/>
+          <a:ext cx="0" cy="0"/>
+          <a:chOff x="0" y="0"/>
+          <a:chExt cx="0" cy="0"/>
+        </a:xfrm>
+      </p:grpSpPr>
+      <p:sp>
+        <p:nvSpPr>
+          <p:cNvPr id="233" name="Google Shape;233;p23"/>
+          <p:cNvSpPr txBox="1">
+            <a:spLocks noGrp="1"/>
+          </p:cNvSpPr>
+          <p:nvPr>
+            <p:ph type="title"/>
+          </p:nvPr>
+        </p:nvSpPr>
+        <p:spPr>
+          <a:xfrm>
+            <a:off x="311700" y="445025"/>
+            <a:ext cx="8520600" cy="572700"/>
+          </a:xfrm>
+          <a:prstGeom prst="rect">
+            <a:avLst/>
+          </a:prstGeom>
+        </p:spPr>
+        <p:txBody>
+          <a:bodyPr spcFirstLastPara="1" wrap="square" lIns="91425" tIns="91425" rIns="91425" bIns="91425" anchor="t" anchorCtr="0">
+            <a:normAutofit fontScale="90000"/>
+          </a:bodyPr>
+          <a:lstStyle/>
+          <a:p>
+            <a:pPr marL="0" lvl="0" indent="0" algn="l" rtl="0">
+              <a:spcBef>
+                <a:spcPts val="0"/>
+              </a:spcBef>
+              <a:spcAft>
+                <a:spcPts val="0"/>
+              </a:spcAft>
+              <a:buNone/>
+            </a:pPr>
+            <a:r>
+              <a:rPr lang="en"/>
+              <a:t>MIPS ISA Architecture: OS interface</a:t>
+            </a:r>
+            <a:endParaRPr/>
+          </a:p>
+        </p:txBody>
+      </p:sp>
+      <p:sp>
+        <p:nvSpPr>
+          <p:cNvPr id="234" name="Google Shape;234;p23"/>
+          <p:cNvSpPr txBox="1">
+            <a:spLocks noGrp="1"/>
+          </p:cNvSpPr>
+          <p:nvPr>
+            <p:ph type="body" idx="1"/>
+          </p:nvPr>
+        </p:nvSpPr>
+        <p:spPr>
+          <a:xfrm>
+            <a:off x="311700" y="1152475"/>
+            <a:ext cx="8520600" cy="3416400"/>
+          </a:xfrm>
+          <a:prstGeom prst="rect">
+            <a:avLst/>
+          </a:prstGeom>
+        </p:spPr>
+        <p:txBody>
+          <a:bodyPr spcFirstLastPara="1" wrap="square" lIns="91425" tIns="91425" rIns="91425" bIns="91425" anchor="t" anchorCtr="0">
+            <a:normAutofit/>
+          </a:bodyPr>
+          <a:lstStyle/>
+          <a:p>
+            <a:pPr marL="457200" lvl="0" indent="-342900" algn="l" rtl="0">
+              <a:spcBef>
+                <a:spcPts val="0"/>
+              </a:spcBef>
+              <a:spcAft>
+                <a:spcPts val="0"/>
+              </a:spcAft>
+              <a:buSzPts val="1800"/>
+              <a:buChar char="●"/>
+            </a:pPr>
+            <a:endParaRPr lang="en" dirty="0"/>
+          </a:p>
+          <a:p>
+            <a:pPr marL="457200" lvl="0" indent="-342900" algn="l" rtl="0">
+              <a:spcBef>
+                <a:spcPts val="0"/>
+              </a:spcBef>
+              <a:spcAft>
+                <a:spcPts val="0"/>
+              </a:spcAft>
+              <a:buSzPts val="1800"/>
+              <a:buChar char="●"/>
+            </a:pPr>
+            <a:r>
+              <a:rPr lang="en" dirty="0"/>
+              <a:t>Service Requests to the operating system via the ‘</a:t>
+            </a:r>
+            <a:r>
+              <a:rPr lang="en" dirty="0" err="1"/>
+              <a:t>syscall</a:t>
+            </a:r>
+            <a:r>
+              <a:rPr lang="en" dirty="0"/>
+              <a:t>' instruction</a:t>
+            </a:r>
+            <a:endParaRPr dirty="0"/>
+          </a:p>
+        </p:txBody>
+      </p:sp>
+      <p:graphicFrame>
+        <p:nvGraphicFramePr>
+          <p:cNvPr id="235" name="Google Shape;235;p23"/>
+          <p:cNvGraphicFramePr/>
+          <p:nvPr>
+            <p:extLst>
+              <p:ext uri="{D42A27DB-BD31-4B8C-83A1-F6EECF244321}">
+                <p14:modId xmlns:p14="http://schemas.microsoft.com/office/powerpoint/2010/main" val="4072498710"/>
+              </p:ext>
+            </p:extLst>
+          </p:nvPr>
+        </p:nvGraphicFramePr>
+        <p:xfrm>
+          <a:off x="895730" y="2041999"/>
+          <a:ext cx="6380075" cy="2803980"/>
+        </p:xfrm>
+        <a:graphic>
+          <a:graphicData uri="http://schemas.openxmlformats.org/drawingml/2006/table">
+            <a:tbl>
+              <a:tblPr>
+                <a:noFill/>
+              </a:tblPr>
+              <a:tblGrid>
+                <a:gridCol w="1469750">
+                  <a:extLst>
+                    <a:ext uri="{9D8B030D-6E8A-4147-A177-3AD203B41FA5}">
+                      <a16:colId xmlns:a16="http://schemas.microsoft.com/office/drawing/2014/main" val="20000"/>
+                    </a:ext>
+                  </a:extLst>
+                </a:gridCol>
+                <a:gridCol w="655575">
+                  <a:extLst>
+                    <a:ext uri="{9D8B030D-6E8A-4147-A177-3AD203B41FA5}">
+                      <a16:colId xmlns:a16="http://schemas.microsoft.com/office/drawing/2014/main" val="20001"/>
+                    </a:ext>
+                  </a:extLst>
+                </a:gridCol>
+                <a:gridCol w="1997650">
+                  <a:extLst>
+                    <a:ext uri="{9D8B030D-6E8A-4147-A177-3AD203B41FA5}">
+                      <a16:colId xmlns:a16="http://schemas.microsoft.com/office/drawing/2014/main" val="20002"/>
+                    </a:ext>
+                  </a:extLst>
+                </a:gridCol>
+                <a:gridCol w="2257100">
+                  <a:extLst>
+                    <a:ext uri="{9D8B030D-6E8A-4147-A177-3AD203B41FA5}">
+                      <a16:colId xmlns:a16="http://schemas.microsoft.com/office/drawing/2014/main" val="20003"/>
+                    </a:ext>
+                  </a:extLst>
+                </a:gridCol>
+              </a:tblGrid>
+              <a:tr h="381000">
+                <a:tc>
+                  <a:txBody>
+                    <a:bodyPr/>
+                    <a:lstStyle/>
+                    <a:p>
+                      <a:pPr marL="0" lvl="0" indent="0" algn="l" rtl="0">
+                        <a:spcBef>
+                          <a:spcPts val="0"/>
+                        </a:spcBef>
+                        <a:spcAft>
+                          <a:spcPts val="0"/>
+                        </a:spcAft>
+                        <a:buNone/>
+                      </a:pPr>
+                      <a:r>
+                        <a:rPr lang="en"/>
+                        <a:t>Service Name</a:t>
+                      </a:r>
+                      <a:endParaRPr/>
+                    </a:p>
+                  </a:txBody>
+                  <a:tcPr marL="91425" marR="91425" marT="91425" marB="91425"/>
+                </a:tc>
+                <a:tc>
+                  <a:txBody>
+                    <a:bodyPr/>
+                    <a:lstStyle/>
+                    <a:p>
+                      <a:pPr marL="0" lvl="0" indent="0" algn="l" rtl="0">
+                        <a:spcBef>
+                          <a:spcPts val="0"/>
+                        </a:spcBef>
+                        <a:spcAft>
+                          <a:spcPts val="0"/>
+                        </a:spcAft>
+                        <a:buNone/>
+                      </a:pPr>
+                      <a:r>
+                        <a:rPr lang="en"/>
+                        <a:t>$v0</a:t>
+                      </a:r>
+                      <a:endParaRPr/>
+                    </a:p>
+                  </a:txBody>
+                  <a:tcPr marL="91425" marR="91425" marT="91425" marB="91425"/>
+                </a:tc>
+                <a:tc>
+                  <a:txBody>
+                    <a:bodyPr/>
+                    <a:lstStyle/>
+                    <a:p>
+                      <a:pPr marL="0" lvl="0" indent="0" algn="l" rtl="0">
+                        <a:spcBef>
+                          <a:spcPts val="0"/>
+                        </a:spcBef>
+                        <a:spcAft>
+                          <a:spcPts val="0"/>
+                        </a:spcAft>
+                        <a:buNone/>
+                      </a:pPr>
+                      <a:r>
+                        <a:rPr lang="en"/>
+                        <a:t>input:  $a0..$a3</a:t>
+                      </a:r>
+                      <a:endParaRPr/>
+                    </a:p>
+                  </a:txBody>
+                  <a:tcPr marL="91425" marR="91425" marT="91425" marB="91425"/>
+                </a:tc>
+                <a:tc>
+                  <a:txBody>
+                    <a:bodyPr/>
+                    <a:lstStyle/>
+                    <a:p>
+                      <a:pPr marL="0" lvl="0" indent="0" algn="l" rtl="0">
+                        <a:spcBef>
+                          <a:spcPts val="0"/>
+                        </a:spcBef>
+                        <a:spcAft>
+                          <a:spcPts val="0"/>
+                        </a:spcAft>
+                        <a:buNone/>
+                      </a:pPr>
+                      <a:r>
+                        <a:rPr lang="en"/>
+                        <a:t>output: $v0..$v1</a:t>
+                      </a:r>
+                      <a:endParaRPr/>
+                    </a:p>
+                  </a:txBody>
+                  <a:tcPr marL="91425" marR="91425" marT="91425" marB="91425"/>
+                </a:tc>
+                <a:extLst>
+                  <a:ext uri="{0D108BD9-81ED-4DB2-BD59-A6C34878D82A}">
+                    <a16:rowId xmlns:a16="http://schemas.microsoft.com/office/drawing/2014/main" val="10000"/>
+                  </a:ext>
+                </a:extLst>
+              </a:tr>
+              <a:tr h="381000">
+                <a:tc>
+                  <a:txBody>
+                    <a:bodyPr/>
+                    <a:lstStyle/>
+                    <a:p>
+                      <a:pPr marL="0" lvl="0" indent="0" algn="l" rtl="0">
+                        <a:spcBef>
+                          <a:spcPts val="0"/>
+                        </a:spcBef>
+                        <a:spcAft>
+                          <a:spcPts val="0"/>
+                        </a:spcAft>
+                        <a:buNone/>
+                      </a:pPr>
+                      <a:r>
+                        <a:rPr lang="en"/>
+                        <a:t>print integer</a:t>
+                      </a:r>
+                      <a:endParaRPr/>
+                    </a:p>
+                  </a:txBody>
+                  <a:tcPr marL="91425" marR="91425" marT="91425" marB="91425"/>
+                </a:tc>
+                <a:tc>
+                  <a:txBody>
+                    <a:bodyPr/>
+                    <a:lstStyle/>
+                    <a:p>
+                      <a:pPr marL="0" lvl="0" indent="0" algn="l" rtl="0">
+                        <a:spcBef>
+                          <a:spcPts val="0"/>
+                        </a:spcBef>
+                        <a:spcAft>
+                          <a:spcPts val="0"/>
+                        </a:spcAft>
+                        <a:buNone/>
+                      </a:pPr>
+                      <a:r>
+                        <a:rPr lang="en"/>
+                        <a:t>1</a:t>
+                      </a:r>
+                      <a:endParaRPr/>
+                    </a:p>
+                  </a:txBody>
+                  <a:tcPr marL="91425" marR="91425" marT="91425" marB="91425"/>
+                </a:tc>
+                <a:tc>
+                  <a:txBody>
+                    <a:bodyPr/>
+                    <a:lstStyle/>
+                    <a:p>
+                      <a:pPr marL="0" lvl="0" indent="0" algn="l" rtl="0">
+                        <a:spcBef>
+                          <a:spcPts val="0"/>
+                        </a:spcBef>
+                        <a:spcAft>
+                          <a:spcPts val="0"/>
+                        </a:spcAft>
+                        <a:buNone/>
+                      </a:pPr>
+                      <a:r>
+                        <a:rPr lang="en"/>
+                        <a:t>$a0 = value</a:t>
+                      </a:r>
+                      <a:endParaRPr/>
+                    </a:p>
+                  </a:txBody>
+                  <a:tcPr marL="91425" marR="91425" marT="91425" marB="91425"/>
+                </a:tc>
+                <a:tc>
+                  <a:txBody>
+                    <a:bodyPr/>
+                    <a:lstStyle/>
+                    <a:p>
+                      <a:pPr marL="0" lvl="0" indent="0" algn="l" rtl="0">
+                        <a:spcBef>
+                          <a:spcPts val="0"/>
+                        </a:spcBef>
+                        <a:spcAft>
+                          <a:spcPts val="0"/>
+                        </a:spcAft>
+                        <a:buNone/>
+                      </a:pPr>
+                      <a:r>
+                        <a:rPr lang="en"/>
+                        <a:t>none</a:t>
+                      </a:r>
+                      <a:endParaRPr/>
+                    </a:p>
+                  </a:txBody>
+                  <a:tcPr marL="91425" marR="91425" marT="91425" marB="91425"/>
+                </a:tc>
+                <a:extLst>
+                  <a:ext uri="{0D108BD9-81ED-4DB2-BD59-A6C34878D82A}">
+                    <a16:rowId xmlns:a16="http://schemas.microsoft.com/office/drawing/2014/main" val="10001"/>
+                  </a:ext>
+                </a:extLst>
+              </a:tr>
+              <a:tr h="381000">
+                <a:tc>
+                  <a:txBody>
+                    <a:bodyPr/>
+                    <a:lstStyle/>
+                    <a:p>
+                      <a:pPr marL="0" lvl="0" indent="0" algn="l" rtl="0">
+                        <a:spcBef>
+                          <a:spcPts val="0"/>
+                        </a:spcBef>
+                        <a:spcAft>
+                          <a:spcPts val="0"/>
+                        </a:spcAft>
+                        <a:buNone/>
+                      </a:pPr>
+                      <a:r>
+                        <a:rPr lang="en"/>
+                        <a:t>read integer</a:t>
+                      </a:r>
+                      <a:endParaRPr/>
+                    </a:p>
+                  </a:txBody>
+                  <a:tcPr marL="91425" marR="91425" marT="91425" marB="91425"/>
+                </a:tc>
+                <a:tc>
+                  <a:txBody>
+                    <a:bodyPr/>
+                    <a:lstStyle/>
+                    <a:p>
+                      <a:pPr marL="0" lvl="0" indent="0" algn="l" rtl="0">
+                        <a:spcBef>
+                          <a:spcPts val="0"/>
+                        </a:spcBef>
+                        <a:spcAft>
+                          <a:spcPts val="0"/>
+                        </a:spcAft>
+                        <a:buNone/>
+                      </a:pPr>
+                      <a:r>
+                        <a:rPr lang="en"/>
+                        <a:t>5</a:t>
+                      </a:r>
+                      <a:endParaRPr/>
+                    </a:p>
+                  </a:txBody>
+                  <a:tcPr marL="91425" marR="91425" marT="91425" marB="91425"/>
+                </a:tc>
+                <a:tc>
+                  <a:txBody>
+                    <a:bodyPr/>
+                    <a:lstStyle/>
+                    <a:p>
+                      <a:pPr marL="0" lvl="0" indent="0" algn="l" rtl="0">
+                        <a:spcBef>
+                          <a:spcPts val="0"/>
+                        </a:spcBef>
+                        <a:spcAft>
+                          <a:spcPts val="0"/>
+                        </a:spcAft>
+                        <a:buNone/>
+                      </a:pPr>
+                      <a:r>
+                        <a:rPr lang="en"/>
+                        <a:t>none</a:t>
+                      </a:r>
+                      <a:endParaRPr/>
+                    </a:p>
+                  </a:txBody>
+                  <a:tcPr marL="91425" marR="91425" marT="91425" marB="91425"/>
+                </a:tc>
+                <a:tc>
+                  <a:txBody>
+                    <a:bodyPr/>
+                    <a:lstStyle/>
+                    <a:p>
+                      <a:pPr marL="0" lvl="0" indent="0" algn="l" rtl="0">
+                        <a:spcBef>
+                          <a:spcPts val="0"/>
+                        </a:spcBef>
+                        <a:spcAft>
+                          <a:spcPts val="0"/>
+                        </a:spcAft>
+                        <a:buNone/>
+                      </a:pPr>
+                      <a:r>
+                        <a:rPr lang="en"/>
+                        <a:t>$v0 = value</a:t>
+                      </a:r>
+                      <a:endParaRPr/>
+                    </a:p>
+                  </a:txBody>
+                  <a:tcPr marL="91425" marR="91425" marT="91425" marB="91425"/>
+                </a:tc>
+                <a:extLst>
+                  <a:ext uri="{0D108BD9-81ED-4DB2-BD59-A6C34878D82A}">
+                    <a16:rowId xmlns:a16="http://schemas.microsoft.com/office/drawing/2014/main" val="10002"/>
+                  </a:ext>
+                </a:extLst>
+              </a:tr>
+              <a:tr h="381000">
+                <a:tc>
+                  <a:txBody>
+                    <a:bodyPr/>
+                    <a:lstStyle/>
+                    <a:p>
+                      <a:pPr marL="0" lvl="0" indent="0" algn="l" rtl="0">
+                        <a:spcBef>
+                          <a:spcPts val="0"/>
+                        </a:spcBef>
+                        <a:spcAft>
+                          <a:spcPts val="0"/>
+                        </a:spcAft>
+                        <a:buNone/>
+                      </a:pPr>
+                      <a:r>
+                        <a:rPr lang="en"/>
+                        <a:t>malloc </a:t>
+                      </a:r>
+                      <a:endParaRPr/>
+                    </a:p>
+                  </a:txBody>
+                  <a:tcPr marL="91425" marR="91425" marT="91425" marB="91425"/>
+                </a:tc>
+                <a:tc>
+                  <a:txBody>
+                    <a:bodyPr/>
+                    <a:lstStyle/>
+                    <a:p>
+                      <a:pPr marL="0" lvl="0" indent="0" algn="l" rtl="0">
+                        <a:spcBef>
+                          <a:spcPts val="0"/>
+                        </a:spcBef>
+                        <a:spcAft>
+                          <a:spcPts val="0"/>
+                        </a:spcAft>
+                        <a:buNone/>
+                      </a:pPr>
+                      <a:r>
+                        <a:rPr lang="en"/>
+                        <a:t>9</a:t>
+                      </a:r>
+                      <a:endParaRPr/>
+                    </a:p>
+                  </a:txBody>
+                  <a:tcPr marL="91425" marR="91425" marT="91425" marB="91425"/>
+                </a:tc>
+                <a:tc>
+                  <a:txBody>
+                    <a:bodyPr/>
+                    <a:lstStyle/>
+                    <a:p>
+                      <a:pPr marL="0" lvl="0" indent="0" algn="l" rtl="0">
+                        <a:spcBef>
+                          <a:spcPts val="0"/>
+                        </a:spcBef>
+                        <a:spcAft>
+                          <a:spcPts val="0"/>
+                        </a:spcAft>
+                        <a:buNone/>
+                      </a:pPr>
+                      <a:r>
+                        <a:rPr lang="en"/>
+                        <a:t>$a0 = size</a:t>
+                      </a:r>
+                      <a:endParaRPr/>
+                    </a:p>
+                  </a:txBody>
+                  <a:tcPr marL="91425" marR="91425" marT="91425" marB="91425"/>
+                </a:tc>
+                <a:tc>
+                  <a:txBody>
+                    <a:bodyPr/>
+                    <a:lstStyle/>
+                    <a:p>
+                      <a:pPr marL="0" lvl="0" indent="0" algn="l" rtl="0">
+                        <a:spcBef>
+                          <a:spcPts val="0"/>
+                        </a:spcBef>
+                        <a:spcAft>
+                          <a:spcPts val="0"/>
+                        </a:spcAft>
+                        <a:buNone/>
+                      </a:pPr>
+                      <a:r>
+                        <a:rPr lang="en"/>
+                        <a:t>$v0 = buffer address</a:t>
+                      </a:r>
+                      <a:endParaRPr/>
+                    </a:p>
+                  </a:txBody>
+                  <a:tcPr marL="91425" marR="91425" marT="91425" marB="91425"/>
+                </a:tc>
+                <a:extLst>
+                  <a:ext uri="{0D108BD9-81ED-4DB2-BD59-A6C34878D82A}">
+                    <a16:rowId xmlns:a16="http://schemas.microsoft.com/office/drawing/2014/main" val="10003"/>
+                  </a:ext>
+                </a:extLst>
+              </a:tr>
+              <a:tr h="381000">
+                <a:tc>
+                  <a:txBody>
+                    <a:bodyPr/>
+                    <a:lstStyle/>
+                    <a:p>
+                      <a:pPr marL="0" lvl="0" indent="0" algn="l" rtl="0">
+                        <a:spcBef>
+                          <a:spcPts val="0"/>
+                        </a:spcBef>
+                        <a:spcAft>
+                          <a:spcPts val="0"/>
+                        </a:spcAft>
+                        <a:buNone/>
+                      </a:pPr>
+                      <a:r>
+                        <a:rPr lang="en"/>
+                        <a:t>exit</a:t>
+                      </a:r>
+                      <a:endParaRPr/>
+                    </a:p>
+                  </a:txBody>
+                  <a:tcPr marL="91425" marR="91425" marT="91425" marB="91425"/>
+                </a:tc>
+                <a:tc>
+                  <a:txBody>
+                    <a:bodyPr/>
+                    <a:lstStyle/>
+                    <a:p>
+                      <a:pPr marL="0" lvl="0" indent="0" algn="l" rtl="0">
+                        <a:spcBef>
+                          <a:spcPts val="0"/>
+                        </a:spcBef>
+                        <a:spcAft>
+                          <a:spcPts val="0"/>
+                        </a:spcAft>
+                        <a:buNone/>
+                      </a:pPr>
+                      <a:r>
+                        <a:rPr lang="en"/>
+                        <a:t>10</a:t>
+                      </a:r>
+                      <a:endParaRPr/>
+                    </a:p>
+                  </a:txBody>
+                  <a:tcPr marL="91425" marR="91425" marT="91425" marB="91425"/>
+                </a:tc>
+                <a:tc>
+                  <a:txBody>
+                    <a:bodyPr/>
+                    <a:lstStyle/>
+                    <a:p>
+                      <a:pPr marL="0" lvl="0" indent="0" algn="l" rtl="0">
+                        <a:spcBef>
+                          <a:spcPts val="0"/>
+                        </a:spcBef>
+                        <a:spcAft>
+                          <a:spcPts val="0"/>
+                        </a:spcAft>
+                        <a:buNone/>
+                      </a:pPr>
+                      <a:r>
+                        <a:rPr lang="en"/>
+                        <a:t>none</a:t>
+                      </a:r>
+                      <a:endParaRPr/>
+                    </a:p>
+                  </a:txBody>
+                  <a:tcPr marL="91425" marR="91425" marT="91425" marB="91425"/>
+                </a:tc>
+                <a:tc>
+                  <a:txBody>
+                    <a:bodyPr/>
+                    <a:lstStyle/>
+                    <a:p>
+                      <a:pPr marL="0" lvl="0" indent="0" algn="l" rtl="0">
+                        <a:spcBef>
+                          <a:spcPts val="0"/>
+                        </a:spcBef>
+                        <a:spcAft>
+                          <a:spcPts val="0"/>
+                        </a:spcAft>
+                        <a:buNone/>
+                      </a:pPr>
+                      <a:r>
+                        <a:rPr lang="en"/>
+                        <a:t>none</a:t>
+                      </a:r>
+                      <a:endParaRPr/>
+                    </a:p>
+                  </a:txBody>
+                  <a:tcPr marL="91425" marR="91425" marT="91425" marB="91425"/>
+                </a:tc>
+                <a:extLst>
+                  <a:ext uri="{0D108BD9-81ED-4DB2-BD59-A6C34878D82A}">
+                    <a16:rowId xmlns:a16="http://schemas.microsoft.com/office/drawing/2014/main" val="10004"/>
+                  </a:ext>
+                </a:extLst>
+              </a:tr>
+              <a:tr h="381000">
+                <a:tc>
+                  <a:txBody>
+                    <a:bodyPr/>
+                    <a:lstStyle/>
+                    <a:p>
+                      <a:pPr marL="0" lvl="0" indent="0" algn="l" rtl="0">
+                        <a:spcBef>
+                          <a:spcPts val="0"/>
+                        </a:spcBef>
+                        <a:spcAft>
+                          <a:spcPts val="0"/>
+                        </a:spcAft>
+                        <a:buNone/>
+                      </a:pPr>
+                      <a:r>
+                        <a:rPr lang="en"/>
+                        <a:t>file read</a:t>
+                      </a:r>
+                      <a:endParaRPr/>
+                    </a:p>
+                  </a:txBody>
+                  <a:tcPr marL="91425" marR="91425" marT="91425" marB="91425"/>
+                </a:tc>
+                <a:tc>
+                  <a:txBody>
+                    <a:bodyPr/>
+                    <a:lstStyle/>
+                    <a:p>
+                      <a:pPr marL="0" lvl="0" indent="0" algn="l" rtl="0">
+                        <a:spcBef>
+                          <a:spcPts val="0"/>
+                        </a:spcBef>
+                        <a:spcAft>
+                          <a:spcPts val="0"/>
+                        </a:spcAft>
+                        <a:buNone/>
+                      </a:pPr>
+                      <a:r>
+                        <a:rPr lang="en"/>
+                        <a:t>14</a:t>
+                      </a:r>
+                      <a:endParaRPr/>
+                    </a:p>
+                  </a:txBody>
+                  <a:tcPr marL="91425" marR="91425" marT="91425" marB="91425"/>
+                </a:tc>
+                <a:tc>
+                  <a:txBody>
+                    <a:bodyPr/>
+                    <a:lstStyle/>
+                    <a:p>
+                      <a:pPr marL="0" lvl="0" indent="0" algn="l" rtl="0">
+                        <a:spcBef>
+                          <a:spcPts val="0"/>
+                        </a:spcBef>
+                        <a:spcAft>
+                          <a:spcPts val="0"/>
+                        </a:spcAft>
+                        <a:buNone/>
+                      </a:pPr>
+                      <a:r>
+                        <a:rPr lang="en"/>
+                        <a:t>$a0 = fd, </a:t>
+                      </a:r>
+                      <a:endParaRPr/>
+                    </a:p>
+                    <a:p>
+                      <a:pPr marL="0" lvl="0" indent="0" algn="l" rtl="0">
+                        <a:spcBef>
+                          <a:spcPts val="0"/>
+                        </a:spcBef>
+                        <a:spcAft>
+                          <a:spcPts val="0"/>
+                        </a:spcAft>
+                        <a:buNone/>
+                      </a:pPr>
+                      <a:r>
+                        <a:rPr lang="en"/>
+                        <a:t>$a1 = buffer address</a:t>
+                      </a:r>
+                      <a:endParaRPr/>
+                    </a:p>
+                    <a:p>
+                      <a:pPr marL="0" lvl="0" indent="0" algn="l" rtl="0">
+                        <a:spcBef>
+                          <a:spcPts val="0"/>
+                        </a:spcBef>
+                        <a:spcAft>
+                          <a:spcPts val="0"/>
+                        </a:spcAft>
+                        <a:buNone/>
+                      </a:pPr>
+                      <a:r>
+                        <a:rPr lang="en"/>
+                        <a:t>$a2 = num bytes</a:t>
+                      </a:r>
+                      <a:endParaRPr/>
+                    </a:p>
+                  </a:txBody>
+                  <a:tcPr marL="91425" marR="91425" marT="91425" marB="91425"/>
+                </a:tc>
+                <a:tc>
+                  <a:txBody>
+                    <a:bodyPr/>
+                    <a:lstStyle/>
+                    <a:p>
+                      <a:pPr marL="0" lvl="0" indent="0" algn="l" rtl="0">
+                        <a:spcBef>
+                          <a:spcPts val="0"/>
+                        </a:spcBef>
+                        <a:spcAft>
+                          <a:spcPts val="0"/>
+                        </a:spcAft>
+                        <a:buNone/>
+                      </a:pPr>
+                      <a:r>
+                        <a:rPr lang="en" dirty="0"/>
+                        <a:t>$v0 = bytes read</a:t>
+                      </a:r>
+                      <a:endParaRPr dirty="0"/>
+                    </a:p>
+                    <a:p>
+                      <a:pPr marL="0" lvl="0" indent="0" algn="l" rtl="0">
+                        <a:spcBef>
+                          <a:spcPts val="0"/>
+                        </a:spcBef>
+                        <a:spcAft>
+                          <a:spcPts val="0"/>
+                        </a:spcAft>
+                        <a:buNone/>
+                      </a:pPr>
+                      <a:r>
+                        <a:rPr lang="en" dirty="0"/>
+                        <a:t>           -1 == error</a:t>
+                      </a:r>
+                      <a:endParaRPr dirty="0"/>
+                    </a:p>
+                    <a:p>
+                      <a:pPr marL="0" lvl="0" indent="0" algn="l" rtl="0">
+                        <a:spcBef>
+                          <a:spcPts val="0"/>
+                        </a:spcBef>
+                        <a:spcAft>
+                          <a:spcPts val="0"/>
+                        </a:spcAft>
+                        <a:buNone/>
+                      </a:pPr>
+                      <a:r>
+                        <a:rPr lang="en" dirty="0"/>
+                        <a:t>            0 == </a:t>
+                      </a:r>
+                      <a:r>
+                        <a:rPr lang="en" dirty="0" err="1"/>
+                        <a:t>eof</a:t>
+                      </a:r>
+                      <a:endParaRPr dirty="0"/>
+                    </a:p>
+                  </a:txBody>
+                  <a:tcPr marL="91425" marR="91425" marT="91425" marB="91425"/>
+                </a:tc>
+                <a:extLst>
+                  <a:ext uri="{0D108BD9-81ED-4DB2-BD59-A6C34878D82A}">
+                    <a16:rowId xmlns:a16="http://schemas.microsoft.com/office/drawing/2014/main" val="10005"/>
+                  </a:ext>
+                </a:extLst>
+              </a:tr>
+            </a:tbl>
+          </a:graphicData>
+        </a:graphic>
+      </p:graphicFrame>
+      <p:sp>
+        <p:nvSpPr>
+          <p:cNvPr id="2" name="TextBox 1">
+            <a:extLst>
+              <a:ext uri="{FF2B5EF4-FFF2-40B4-BE49-F238E27FC236}">
+                <a16:creationId xmlns:a16="http://schemas.microsoft.com/office/drawing/2014/main" id="{52E8271B-F2D0-1842-AAFA-1838948C8275}"/>
+              </a:ext>
+            </a:extLst>
+          </p:cNvPr>
+          <p:cNvSpPr txBox="1"/>
+          <p:nvPr/>
+        </p:nvSpPr>
+        <p:spPr>
+          <a:xfrm>
+            <a:off x="6185816" y="220298"/>
+            <a:ext cx="2813538" cy="1169551"/>
+          </a:xfrm>
+          <a:prstGeom prst="rect">
+            <a:avLst/>
+          </a:prstGeom>
+          <a:noFill/>
+        </p:spPr>
+        <p:txBody>
+          <a:bodyPr wrap="square" rtlCol="0">
+            <a:spAutoFit/>
+          </a:bodyPr>
+          <a:lstStyle/>
+          <a:p>
+            <a:r>
+              <a:rPr lang="en-US" dirty="0">
+                <a:latin typeface="Source Code Pro" panose="020B0509030403020204" pitchFamily="49" charset="0"/>
+                <a:ea typeface="Source Code Pro" panose="020B0509030403020204" pitchFamily="49" charset="0"/>
+              </a:rPr>
+              <a:t># Print the integer ‘1’</a:t>
+            </a:r>
+            <a:br>
+              <a:rPr lang="en-US" dirty="0">
+                <a:latin typeface="Source Code Pro" panose="020B0509030403020204" pitchFamily="49" charset="0"/>
+                <a:ea typeface="Source Code Pro" panose="020B0509030403020204" pitchFamily="49" charset="0"/>
+              </a:rPr>
+            </a:br>
+            <a:r>
+              <a:rPr lang="en-US" dirty="0">
+                <a:latin typeface="Source Code Pro" panose="020B0509030403020204" pitchFamily="49" charset="0"/>
+                <a:ea typeface="Source Code Pro" panose="020B0509030403020204" pitchFamily="49" charset="0"/>
+              </a:rPr>
+              <a:t># Macro: </a:t>
+            </a:r>
+            <a:r>
+              <a:rPr lang="en-US" dirty="0" err="1">
+                <a:latin typeface="Source Code Pro" panose="020B0509030403020204" pitchFamily="49" charset="0"/>
+                <a:ea typeface="Source Code Pro" panose="020B0509030403020204" pitchFamily="49" charset="0"/>
+              </a:rPr>
+              <a:t>print_di</a:t>
+            </a:r>
+            <a:r>
+              <a:rPr lang="en-US" dirty="0">
+                <a:latin typeface="Source Code Pro" panose="020B0509030403020204" pitchFamily="49" charset="0"/>
+                <a:ea typeface="Source Code Pro" panose="020B0509030403020204" pitchFamily="49" charset="0"/>
+              </a:rPr>
+              <a:t> %</a:t>
+            </a:r>
+            <a:r>
+              <a:rPr lang="en-US" dirty="0" err="1">
+                <a:latin typeface="Source Code Pro" panose="020B0509030403020204" pitchFamily="49" charset="0"/>
+                <a:ea typeface="Source Code Pro" panose="020B0509030403020204" pitchFamily="49" charset="0"/>
+              </a:rPr>
+              <a:t>imm</a:t>
+            </a:r>
+            <a:br>
+              <a:rPr lang="en-US" dirty="0">
+                <a:latin typeface="Source Code Pro" panose="020B0509030403020204" pitchFamily="49" charset="0"/>
+                <a:ea typeface="Source Code Pro" panose="020B0509030403020204" pitchFamily="49" charset="0"/>
+              </a:rPr>
+            </a:br>
+            <a:r>
+              <a:rPr lang="en-US" dirty="0">
+                <a:latin typeface="Source Code Pro" panose="020B0509030403020204" pitchFamily="49" charset="0"/>
+                <a:ea typeface="Source Code Pro" panose="020B0509030403020204" pitchFamily="49" charset="0"/>
+              </a:rPr>
+              <a:t>li $a0, %</a:t>
+            </a:r>
+            <a:r>
+              <a:rPr lang="en-US" dirty="0" err="1">
+                <a:latin typeface="Source Code Pro" panose="020B0509030403020204" pitchFamily="49" charset="0"/>
+                <a:ea typeface="Source Code Pro" panose="020B0509030403020204" pitchFamily="49" charset="0"/>
+              </a:rPr>
+              <a:t>imm</a:t>
+            </a:r>
+            <a:br>
+              <a:rPr lang="en-US" dirty="0">
+                <a:latin typeface="Source Code Pro" panose="020B0509030403020204" pitchFamily="49" charset="0"/>
+                <a:ea typeface="Source Code Pro" panose="020B0509030403020204" pitchFamily="49" charset="0"/>
+              </a:rPr>
+            </a:br>
+            <a:r>
+              <a:rPr lang="en-US" dirty="0">
+                <a:latin typeface="Source Code Pro" panose="020B0509030403020204" pitchFamily="49" charset="0"/>
+                <a:ea typeface="Source Code Pro" panose="020B0509030403020204" pitchFamily="49" charset="0"/>
+              </a:rPr>
+              <a:t>li $v0, 1</a:t>
+            </a:r>
+            <a:br>
+              <a:rPr lang="en-US" dirty="0">
+                <a:latin typeface="Source Code Pro" panose="020B0509030403020204" pitchFamily="49" charset="0"/>
+                <a:ea typeface="Source Code Pro" panose="020B0509030403020204" pitchFamily="49" charset="0"/>
+              </a:rPr>
+            </a:br>
+            <a:r>
+              <a:rPr lang="en-US" dirty="0" err="1">
+                <a:latin typeface="Source Code Pro" panose="020B0509030403020204" pitchFamily="49" charset="0"/>
+                <a:ea typeface="Source Code Pro" panose="020B0509030403020204" pitchFamily="49" charset="0"/>
+              </a:rPr>
+              <a:t>syscall</a:t>
+            </a:r>
+            <a:endParaRPr lang="en-US" dirty="0">
+              <a:latin typeface="Source Code Pro" panose="020B0509030403020204" pitchFamily="49" charset="0"/>
+              <a:ea typeface="Source Code Pro" panose="020B0509030403020204" pitchFamily="49" charset="0"/>
+            </a:endParaRPr>
+          </a:p>
+        </p:txBody>
+      </p:sp>
+    </p:spTree>
+  </p:cSld>
+  <p:clrMapOvr>
+    <a:masterClrMapping/>
+  </p:clrMapOvr>
+</p:sld>
+</file>
+
+<file path=ppt/slides/slide4.xml><?xml version="1.0" encoding="utf-8"?>
+<p:sld xmlns:a="http://schemas.openxmlformats.org/drawingml/2006/main" xmlns:r="http://schemas.openxmlformats.org/officeDocument/2006/relationships" xmlns:p="http://schemas.openxmlformats.org/presentationml/2006/main">
+  <p:cSld>
+    <p:spTree>
+      <p:nvGrpSpPr>
         <p:cNvPr id="1" name="Shape 116"/>
         <p:cNvGrpSpPr/>
         <p:nvPr/>
@@ -11699,7 +14349,7 @@
             </a:pPr>
             <a:r>
               <a:rPr lang="en" dirty="0"/>
-              <a:t>Driving your Car from LA to Vegas</a:t>
+              <a:t>Analogy: Driving your Car from LA to Vegas</a:t>
             </a:r>
             <a:endParaRPr dirty="0"/>
           </a:p>
@@ -11965,7 +14615,7 @@
 </p:sld>
 </file>
 
-<file path=ppt/slides/slide4.xml><?xml version="1.0" encoding="utf-8"?>
+<file path=ppt/slides/slide5.xml><?xml version="1.0" encoding="utf-8"?>
 <p:sld xmlns:a="http://schemas.openxmlformats.org/drawingml/2006/main" xmlns:r="http://schemas.openxmlformats.org/officeDocument/2006/relationships" xmlns:p="http://schemas.openxmlformats.org/presentationml/2006/main">
   <p:cSld>
     <p:spTree>
@@ -12401,7 +15051,7 @@
 </p:sld>
 </file>
 
-<file path=ppt/slides/slide5.xml><?xml version="1.0" encoding="utf-8"?>
+<file path=ppt/slides/slide6.xml><?xml version="1.0" encoding="utf-8"?>
 <p:sld xmlns:a="http://schemas.openxmlformats.org/drawingml/2006/main" xmlns:r="http://schemas.openxmlformats.org/officeDocument/2006/relationships" xmlns:p="http://schemas.openxmlformats.org/presentationml/2006/main">
   <p:cSld>
     <p:spTree>
@@ -14355,7 +17005,7 @@
 </p:sld>
 </file>
 
-<file path=ppt/slides/slide6.xml><?xml version="1.0" encoding="utf-8"?>
+<file path=ppt/slides/slide7.xml><?xml version="1.0" encoding="utf-8"?>
 <p:sld xmlns:a="http://schemas.openxmlformats.org/drawingml/2006/main" xmlns:r="http://schemas.openxmlformats.org/officeDocument/2006/relationships" xmlns:p="http://schemas.openxmlformats.org/presentationml/2006/main">
   <p:cSld>
     <p:spTree>
@@ -15175,7 +17825,7 @@
 </p:sld>
 </file>
 
-<file path=ppt/slides/slide7.xml><?xml version="1.0" encoding="utf-8"?>
+<file path=ppt/slides/slide8.xml><?xml version="1.0" encoding="utf-8"?>
 <p:sld xmlns:a="http://schemas.openxmlformats.org/drawingml/2006/main" xmlns:r="http://schemas.openxmlformats.org/officeDocument/2006/relationships" xmlns:p="http://schemas.openxmlformats.org/presentationml/2006/main">
   <p:cSld>
     <p:spTree>
@@ -16989,7 +19639,7 @@
 </p:sld>
 </file>
 
-<file path=ppt/slides/slide8.xml><?xml version="1.0" encoding="utf-8"?>
+<file path=ppt/slides/slide9.xml><?xml version="1.0" encoding="utf-8"?>
 <p:sld xmlns:a="http://schemas.openxmlformats.org/drawingml/2006/main" xmlns:r="http://schemas.openxmlformats.org/officeDocument/2006/relationships" xmlns:p="http://schemas.openxmlformats.org/presentationml/2006/main">
   <p:cSld>
     <p:spTree>
@@ -19278,1580 +21928,6 @@
               <a:t>a:</a:t>
             </a:r>
             <a:endParaRPr/>
-          </a:p>
-        </p:txBody>
-      </p:sp>
-    </p:spTree>
-  </p:cSld>
-  <p:clrMapOvr>
-    <a:masterClrMapping/>
-  </p:clrMapOvr>
-</p:sld>
-</file>
-
-<file path=ppt/slides/slide9.xml><?xml version="1.0" encoding="utf-8"?>
-<p:sld xmlns:a="http://schemas.openxmlformats.org/drawingml/2006/main" xmlns:r="http://schemas.openxmlformats.org/officeDocument/2006/relationships" xmlns:p="http://schemas.openxmlformats.org/presentationml/2006/main">
-  <p:cSld>
-    <p:spTree>
-      <p:nvGrpSpPr>
-        <p:cNvPr id="1" name="Shape 235"/>
-        <p:cNvGrpSpPr/>
-        <p:nvPr/>
-      </p:nvGrpSpPr>
-      <p:grpSpPr>
-        <a:xfrm>
-          <a:off x="0" y="0"/>
-          <a:ext cx="0" cy="0"/>
-          <a:chOff x="0" y="0"/>
-          <a:chExt cx="0" cy="0"/>
-        </a:xfrm>
-      </p:grpSpPr>
-      <p:sp>
-        <p:nvSpPr>
-          <p:cNvPr id="236" name="Google Shape;236;p21"/>
-          <p:cNvSpPr txBox="1">
-            <a:spLocks noGrp="1"/>
-          </p:cNvSpPr>
-          <p:nvPr>
-            <p:ph type="title"/>
-          </p:nvPr>
-        </p:nvSpPr>
-        <p:spPr>
-          <a:xfrm>
-            <a:off x="311700" y="445025"/>
-            <a:ext cx="8520600" cy="572700"/>
-          </a:xfrm>
-          <a:prstGeom prst="rect">
-            <a:avLst/>
-          </a:prstGeom>
-        </p:spPr>
-        <p:txBody>
-          <a:bodyPr spcFirstLastPara="1" wrap="square" lIns="91425" tIns="91425" rIns="91425" bIns="91425" anchor="t" anchorCtr="0">
-            <a:normAutofit fontScale="90000"/>
-          </a:bodyPr>
-          <a:lstStyle/>
-          <a:p>
-            <a:pPr marL="0" lvl="0" indent="0" algn="l" rtl="0">
-              <a:spcBef>
-                <a:spcPts val="0"/>
-              </a:spcBef>
-              <a:spcAft>
-                <a:spcPts val="0"/>
-              </a:spcAft>
-              <a:buNone/>
-            </a:pPr>
-            <a:r>
-              <a:rPr lang="en"/>
-              <a:t>Memory</a:t>
-            </a:r>
-            <a:endParaRPr/>
-          </a:p>
-        </p:txBody>
-      </p:sp>
-      <p:sp>
-        <p:nvSpPr>
-          <p:cNvPr id="237" name="Google Shape;237;p21"/>
-          <p:cNvSpPr txBox="1">
-            <a:spLocks noGrp="1"/>
-          </p:cNvSpPr>
-          <p:nvPr>
-            <p:ph type="body" idx="1"/>
-          </p:nvPr>
-        </p:nvSpPr>
-        <p:spPr>
-          <a:xfrm>
-            <a:off x="311700" y="1152475"/>
-            <a:ext cx="8520600" cy="3416400"/>
-          </a:xfrm>
-          <a:prstGeom prst="rect">
-            <a:avLst/>
-          </a:prstGeom>
-        </p:spPr>
-        <p:txBody>
-          <a:bodyPr spcFirstLastPara="1" wrap="square" lIns="91425" tIns="91425" rIns="91425" bIns="91425" anchor="t" anchorCtr="0">
-            <a:normAutofit fontScale="92500" lnSpcReduction="20000"/>
-          </a:bodyPr>
-          <a:lstStyle/>
-          <a:p>
-            <a:pPr marL="457200" lvl="0" indent="-342900" algn="l" rtl="0">
-              <a:spcBef>
-                <a:spcPts val="0"/>
-              </a:spcBef>
-              <a:spcAft>
-                <a:spcPts val="0"/>
-              </a:spcAft>
-              <a:buSzPts val="1800"/>
-              <a:buChar char="●"/>
-            </a:pPr>
-            <a:r>
-              <a:rPr lang="en" dirty="0"/>
-              <a:t>We all know what an array is right!</a:t>
-            </a:r>
-            <a:endParaRPr dirty="0"/>
-          </a:p>
-          <a:p>
-            <a:pPr marL="914400" lvl="1" indent="-317500" algn="l" rtl="0">
-              <a:spcBef>
-                <a:spcPts val="0"/>
-              </a:spcBef>
-              <a:spcAft>
-                <a:spcPts val="0"/>
-              </a:spcAft>
-              <a:buSzPts val="1400"/>
-              <a:buChar char="○"/>
-            </a:pPr>
-            <a:r>
-              <a:rPr lang="en" dirty="0"/>
-              <a:t>Memory is just an array of integers (from 0..255):</a:t>
-            </a:r>
-            <a:endParaRPr dirty="0"/>
-          </a:p>
-          <a:p>
-            <a:pPr marL="1371600" lvl="2" indent="-317500" algn="l" rtl="0">
-              <a:spcBef>
-                <a:spcPts val="0"/>
-              </a:spcBef>
-              <a:spcAft>
-                <a:spcPts val="0"/>
-              </a:spcAft>
-              <a:buSzPts val="1400"/>
-              <a:buChar char="■"/>
-            </a:pPr>
-            <a:r>
-              <a:rPr lang="en" dirty="0"/>
-              <a:t>mem[ index ] = value</a:t>
-            </a:r>
-            <a:endParaRPr dirty="0"/>
-          </a:p>
-          <a:p>
-            <a:pPr marL="457200" lvl="0" indent="-342900" algn="l" rtl="0">
-              <a:spcBef>
-                <a:spcPts val="0"/>
-              </a:spcBef>
-              <a:spcAft>
-                <a:spcPts val="0"/>
-              </a:spcAft>
-              <a:buSzPts val="1800"/>
-              <a:buChar char="●"/>
-            </a:pPr>
-            <a:r>
-              <a:rPr lang="en" dirty="0"/>
-              <a:t>Do you know what an associative array is?</a:t>
-            </a:r>
-            <a:endParaRPr dirty="0"/>
-          </a:p>
-          <a:p>
-            <a:pPr marL="914400" lvl="1" indent="-317500" algn="l" rtl="0">
-              <a:spcBef>
-                <a:spcPts val="0"/>
-              </a:spcBef>
-              <a:spcAft>
-                <a:spcPts val="0"/>
-              </a:spcAft>
-              <a:buSzPts val="1400"/>
-              <a:buChar char="○"/>
-            </a:pPr>
-            <a:r>
-              <a:rPr lang="en" dirty="0"/>
-              <a:t>It's just an array that stores both the </a:t>
-            </a:r>
-            <a:r>
-              <a:rPr lang="en" dirty="0" err="1"/>
-              <a:t>lval</a:t>
-            </a:r>
-            <a:r>
-              <a:rPr lang="en" dirty="0"/>
-              <a:t> and </a:t>
-            </a:r>
-            <a:r>
-              <a:rPr lang="en" dirty="0" err="1"/>
-              <a:t>rval</a:t>
-            </a:r>
-            <a:r>
-              <a:rPr lang="en" dirty="0"/>
-              <a:t> of a variable: </a:t>
-            </a:r>
-            <a:endParaRPr dirty="0"/>
-          </a:p>
-          <a:p>
-            <a:pPr marL="1371600" lvl="2" indent="-317500" algn="l" rtl="0">
-              <a:spcBef>
-                <a:spcPts val="0"/>
-              </a:spcBef>
-              <a:spcAft>
-                <a:spcPts val="0"/>
-              </a:spcAft>
-              <a:buSzPts val="1400"/>
-              <a:buChar char="■"/>
-            </a:pPr>
-            <a:r>
-              <a:rPr lang="en" dirty="0"/>
-              <a:t>array[ </a:t>
-            </a:r>
-            <a:r>
-              <a:rPr lang="en" i="1" dirty="0"/>
-              <a:t>"name" </a:t>
-            </a:r>
-            <a:r>
-              <a:rPr lang="en" dirty="0"/>
-              <a:t>] = value;    mem[ "steven" ] = 32</a:t>
-            </a:r>
-            <a:endParaRPr dirty="0"/>
-          </a:p>
-          <a:p>
-            <a:pPr marL="914400" lvl="1" indent="-317500" algn="l" rtl="0">
-              <a:spcBef>
-                <a:spcPts val="0"/>
-              </a:spcBef>
-              <a:spcAft>
-                <a:spcPts val="0"/>
-              </a:spcAft>
-              <a:buSzPts val="1400"/>
-              <a:buChar char="○"/>
-            </a:pPr>
-            <a:r>
-              <a:rPr lang="en" dirty="0"/>
-              <a:t>You use "name" to lookup the appropriate index</a:t>
-            </a:r>
-            <a:endParaRPr dirty="0"/>
-          </a:p>
-          <a:p>
-            <a:pPr marL="457200" lvl="0" indent="-342900" algn="l" rtl="0">
-              <a:spcBef>
-                <a:spcPts val="0"/>
-              </a:spcBef>
-              <a:spcAft>
-                <a:spcPts val="0"/>
-              </a:spcAft>
-              <a:buSzPts val="1800"/>
-              <a:buChar char="●"/>
-            </a:pPr>
-            <a:r>
-              <a:rPr lang="en" dirty="0"/>
-              <a:t>Consider the memory to the right</a:t>
-            </a:r>
-            <a:endParaRPr dirty="0"/>
-          </a:p>
-          <a:p>
-            <a:pPr marL="457200" lvl="0" indent="0" algn="l" rtl="0">
-              <a:spcBef>
-                <a:spcPts val="1200"/>
-              </a:spcBef>
-              <a:spcAft>
-                <a:spcPts val="0"/>
-              </a:spcAft>
-              <a:buNone/>
-            </a:pPr>
-            <a:endParaRPr dirty="0"/>
-          </a:p>
-          <a:p>
-            <a:pPr marL="457200" lvl="0" indent="-342900" algn="l" rtl="0">
-              <a:spcBef>
-                <a:spcPts val="1200"/>
-              </a:spcBef>
-              <a:spcAft>
-                <a:spcPts val="0"/>
-              </a:spcAft>
-              <a:buSzPts val="1800"/>
-              <a:buChar char="●"/>
-            </a:pPr>
-            <a:r>
-              <a:rPr lang="en" dirty="0"/>
-              <a:t>Update the </a:t>
-            </a:r>
-            <a:r>
-              <a:rPr lang="en" u="sng" dirty="0">
-                <a:solidFill>
-                  <a:schemeClr val="hlink"/>
-                </a:solidFill>
-                <a:hlinkClick r:id="rId3"/>
-              </a:rPr>
-              <a:t>memory</a:t>
-            </a:r>
-            <a:r>
-              <a:rPr lang="en" dirty="0"/>
-              <a:t> that I have created for this class</a:t>
-            </a:r>
-            <a:endParaRPr dirty="0"/>
-          </a:p>
-          <a:p>
-            <a:pPr marL="914400" lvl="1" indent="-317500" algn="l" rtl="0">
-              <a:spcBef>
-                <a:spcPts val="0"/>
-              </a:spcBef>
-              <a:spcAft>
-                <a:spcPts val="0"/>
-              </a:spcAft>
-              <a:buSzPts val="1400"/>
-              <a:buChar char="○"/>
-            </a:pPr>
-            <a:r>
-              <a:rPr lang="en" dirty="0"/>
-              <a:t>Find your name, update the associated value to be equal to your index.</a:t>
-            </a:r>
-            <a:endParaRPr dirty="0"/>
-          </a:p>
-          <a:p>
-            <a:pPr marL="914400" lvl="1" indent="-317500" algn="l" rtl="0">
-              <a:spcBef>
-                <a:spcPts val="0"/>
-              </a:spcBef>
-              <a:spcAft>
-                <a:spcPts val="0"/>
-              </a:spcAft>
-              <a:buSzPts val="1400"/>
-              <a:buChar char="○"/>
-            </a:pPr>
-            <a:r>
-              <a:rPr lang="en" dirty="0"/>
-              <a:t>That is to say, if your name is steven execute the following statement</a:t>
-            </a:r>
-            <a:endParaRPr dirty="0"/>
-          </a:p>
-          <a:p>
-            <a:pPr marL="1371600" lvl="2" indent="-317500" algn="l" rtl="0">
-              <a:spcBef>
-                <a:spcPts val="0"/>
-              </a:spcBef>
-              <a:spcAft>
-                <a:spcPts val="0"/>
-              </a:spcAft>
-              <a:buSzPts val="1400"/>
-              <a:buChar char="■"/>
-            </a:pPr>
-            <a:r>
-              <a:rPr lang="en" dirty="0"/>
-              <a:t>steven = &amp;steven;</a:t>
-            </a:r>
-            <a:endParaRPr dirty="0"/>
-          </a:p>
-        </p:txBody>
-      </p:sp>
-      <p:sp>
-        <p:nvSpPr>
-          <p:cNvPr id="238" name="Google Shape;238;p21"/>
-          <p:cNvSpPr/>
-          <p:nvPr/>
-        </p:nvSpPr>
-        <p:spPr>
-          <a:xfrm>
-            <a:off x="7315684" y="347796"/>
-            <a:ext cx="558900" cy="345600"/>
-          </a:xfrm>
-          <a:prstGeom prst="rect">
-            <a:avLst/>
-          </a:prstGeom>
-          <a:solidFill>
-            <a:schemeClr val="lt2"/>
-          </a:solidFill>
-          <a:ln w="9525" cap="flat" cmpd="sng">
-            <a:solidFill>
-              <a:schemeClr val="dk2"/>
-            </a:solidFill>
-            <a:prstDash val="solid"/>
-            <a:round/>
-            <a:headEnd type="none" w="sm" len="sm"/>
-            <a:tailEnd type="none" w="sm" len="sm"/>
-          </a:ln>
-        </p:spPr>
-        <p:txBody>
-          <a:bodyPr spcFirstLastPara="1" wrap="square" lIns="91425" tIns="91425" rIns="91425" bIns="91425" anchor="ctr" anchorCtr="0">
-            <a:noAutofit/>
-          </a:bodyPr>
-          <a:lstStyle/>
-          <a:p>
-            <a:pPr marL="0" lvl="0" indent="0" algn="l" rtl="0">
-              <a:spcBef>
-                <a:spcPts val="0"/>
-              </a:spcBef>
-              <a:spcAft>
-                <a:spcPts val="0"/>
-              </a:spcAft>
-              <a:buClr>
-                <a:schemeClr val="dk1"/>
-              </a:buClr>
-              <a:buSzPts val="1100"/>
-              <a:buFont typeface="Arial"/>
-              <a:buNone/>
-            </a:pPr>
-            <a:endParaRPr/>
-          </a:p>
-        </p:txBody>
-      </p:sp>
-      <p:sp>
-        <p:nvSpPr>
-          <p:cNvPr id="239" name="Google Shape;239;p21"/>
-          <p:cNvSpPr/>
-          <p:nvPr/>
-        </p:nvSpPr>
-        <p:spPr>
-          <a:xfrm>
-            <a:off x="7885725" y="347800"/>
-            <a:ext cx="1041300" cy="345600"/>
-          </a:xfrm>
-          <a:prstGeom prst="rect">
-            <a:avLst/>
-          </a:prstGeom>
-          <a:noFill/>
-          <a:ln>
-            <a:noFill/>
-          </a:ln>
-        </p:spPr>
-        <p:txBody>
-          <a:bodyPr spcFirstLastPara="1" wrap="square" lIns="91425" tIns="91425" rIns="91425" bIns="91425" anchor="ctr" anchorCtr="0">
-            <a:noAutofit/>
-          </a:bodyPr>
-          <a:lstStyle/>
-          <a:p>
-            <a:pPr marL="0" lvl="0" indent="0" algn="l" rtl="0">
-              <a:spcBef>
-                <a:spcPts val="0"/>
-              </a:spcBef>
-              <a:spcAft>
-                <a:spcPts val="0"/>
-              </a:spcAft>
-              <a:buNone/>
-            </a:pPr>
-            <a:r>
-              <a:rPr lang="en" sz="1000"/>
-              <a:t>0x8000 000A</a:t>
-            </a:r>
-            <a:endParaRPr sz="1000"/>
-          </a:p>
-        </p:txBody>
-      </p:sp>
-      <p:sp>
-        <p:nvSpPr>
-          <p:cNvPr id="240" name="Google Shape;240;p21"/>
-          <p:cNvSpPr/>
-          <p:nvPr/>
-        </p:nvSpPr>
-        <p:spPr>
-          <a:xfrm>
-            <a:off x="7315684" y="693408"/>
-            <a:ext cx="558900" cy="345600"/>
-          </a:xfrm>
-          <a:prstGeom prst="rect">
-            <a:avLst/>
-          </a:prstGeom>
-          <a:solidFill>
-            <a:schemeClr val="lt2"/>
-          </a:solidFill>
-          <a:ln w="9525" cap="flat" cmpd="sng">
-            <a:solidFill>
-              <a:schemeClr val="dk2"/>
-            </a:solidFill>
-            <a:prstDash val="solid"/>
-            <a:round/>
-            <a:headEnd type="none" w="sm" len="sm"/>
-            <a:tailEnd type="none" w="sm" len="sm"/>
-          </a:ln>
-        </p:spPr>
-        <p:txBody>
-          <a:bodyPr spcFirstLastPara="1" wrap="square" lIns="91425" tIns="91425" rIns="91425" bIns="91425" anchor="ctr" anchorCtr="0">
-            <a:noAutofit/>
-          </a:bodyPr>
-          <a:lstStyle/>
-          <a:p>
-            <a:pPr marL="0" lvl="0" indent="0" algn="ctr" rtl="0">
-              <a:spcBef>
-                <a:spcPts val="0"/>
-              </a:spcBef>
-              <a:spcAft>
-                <a:spcPts val="0"/>
-              </a:spcAft>
-              <a:buNone/>
-            </a:pPr>
-            <a:r>
-              <a:rPr lang="en"/>
-              <a:t>0</a:t>
-            </a:r>
-            <a:endParaRPr/>
-          </a:p>
-        </p:txBody>
-      </p:sp>
-      <p:sp>
-        <p:nvSpPr>
-          <p:cNvPr id="241" name="Google Shape;241;p21"/>
-          <p:cNvSpPr/>
-          <p:nvPr/>
-        </p:nvSpPr>
-        <p:spPr>
-          <a:xfrm>
-            <a:off x="7885725" y="688250"/>
-            <a:ext cx="1041300" cy="345600"/>
-          </a:xfrm>
-          <a:prstGeom prst="rect">
-            <a:avLst/>
-          </a:prstGeom>
-          <a:noFill/>
-          <a:ln>
-            <a:noFill/>
-          </a:ln>
-        </p:spPr>
-        <p:txBody>
-          <a:bodyPr spcFirstLastPara="1" wrap="square" lIns="91425" tIns="91425" rIns="91425" bIns="91425" anchor="ctr" anchorCtr="0">
-            <a:noAutofit/>
-          </a:bodyPr>
-          <a:lstStyle/>
-          <a:p>
-            <a:pPr marL="0" lvl="0" indent="0" algn="l" rtl="0">
-              <a:spcBef>
-                <a:spcPts val="0"/>
-              </a:spcBef>
-              <a:spcAft>
-                <a:spcPts val="0"/>
-              </a:spcAft>
-              <a:buNone/>
-            </a:pPr>
-            <a:r>
-              <a:rPr lang="en" sz="1000"/>
-              <a:t>0x8000 0009</a:t>
-            </a:r>
-            <a:endParaRPr sz="1000"/>
-          </a:p>
-        </p:txBody>
-      </p:sp>
-      <p:sp>
-        <p:nvSpPr>
-          <p:cNvPr id="242" name="Google Shape;242;p21"/>
-          <p:cNvSpPr/>
-          <p:nvPr/>
-        </p:nvSpPr>
-        <p:spPr>
-          <a:xfrm>
-            <a:off x="7315684" y="1038996"/>
-            <a:ext cx="558900" cy="345600"/>
-          </a:xfrm>
-          <a:prstGeom prst="rect">
-            <a:avLst/>
-          </a:prstGeom>
-          <a:solidFill>
-            <a:schemeClr val="lt2"/>
-          </a:solidFill>
-          <a:ln w="9525" cap="flat" cmpd="sng">
-            <a:solidFill>
-              <a:schemeClr val="dk2"/>
-            </a:solidFill>
-            <a:prstDash val="solid"/>
-            <a:round/>
-            <a:headEnd type="none" w="sm" len="sm"/>
-            <a:tailEnd type="none" w="sm" len="sm"/>
-          </a:ln>
-        </p:spPr>
-        <p:txBody>
-          <a:bodyPr spcFirstLastPara="1" wrap="square" lIns="91425" tIns="91425" rIns="91425" bIns="91425" anchor="ctr" anchorCtr="0">
-            <a:noAutofit/>
-          </a:bodyPr>
-          <a:lstStyle/>
-          <a:p>
-            <a:pPr marL="0" lvl="0" indent="0" algn="ctr" rtl="0">
-              <a:spcBef>
-                <a:spcPts val="0"/>
-              </a:spcBef>
-              <a:spcAft>
-                <a:spcPts val="0"/>
-              </a:spcAft>
-              <a:buNone/>
-            </a:pPr>
-            <a:r>
-              <a:rPr lang="en"/>
-              <a:t>3</a:t>
-            </a:r>
-            <a:endParaRPr/>
-          </a:p>
-        </p:txBody>
-      </p:sp>
-      <p:sp>
-        <p:nvSpPr>
-          <p:cNvPr id="243" name="Google Shape;243;p21"/>
-          <p:cNvSpPr/>
-          <p:nvPr/>
-        </p:nvSpPr>
-        <p:spPr>
-          <a:xfrm>
-            <a:off x="6496050" y="1039000"/>
-            <a:ext cx="819600" cy="345600"/>
-          </a:xfrm>
-          <a:prstGeom prst="rect">
-            <a:avLst/>
-          </a:prstGeom>
-          <a:noFill/>
-          <a:ln>
-            <a:noFill/>
-          </a:ln>
-        </p:spPr>
-        <p:txBody>
-          <a:bodyPr spcFirstLastPara="1" wrap="square" lIns="91425" tIns="91425" rIns="91425" bIns="91425" anchor="ctr" anchorCtr="0">
-            <a:noAutofit/>
-          </a:bodyPr>
-          <a:lstStyle/>
-          <a:p>
-            <a:pPr marL="0" lvl="0" indent="0" algn="r" rtl="0">
-              <a:spcBef>
-                <a:spcPts val="0"/>
-              </a:spcBef>
-              <a:spcAft>
-                <a:spcPts val="0"/>
-              </a:spcAft>
-              <a:buNone/>
-            </a:pPr>
-            <a:r>
-              <a:rPr lang="en" sz="1200"/>
-              <a:t>sasank:</a:t>
-            </a:r>
-            <a:endParaRPr sz="1200"/>
-          </a:p>
-        </p:txBody>
-      </p:sp>
-      <p:sp>
-        <p:nvSpPr>
-          <p:cNvPr id="244" name="Google Shape;244;p21"/>
-          <p:cNvSpPr/>
-          <p:nvPr/>
-        </p:nvSpPr>
-        <p:spPr>
-          <a:xfrm>
-            <a:off x="7885725" y="1028700"/>
-            <a:ext cx="1041300" cy="345600"/>
-          </a:xfrm>
-          <a:prstGeom prst="rect">
-            <a:avLst/>
-          </a:prstGeom>
-          <a:noFill/>
-          <a:ln>
-            <a:noFill/>
-          </a:ln>
-        </p:spPr>
-        <p:txBody>
-          <a:bodyPr spcFirstLastPara="1" wrap="square" lIns="91425" tIns="91425" rIns="91425" bIns="91425" anchor="ctr" anchorCtr="0">
-            <a:noAutofit/>
-          </a:bodyPr>
-          <a:lstStyle/>
-          <a:p>
-            <a:pPr marL="0" lvl="0" indent="0" algn="l" rtl="0">
-              <a:spcBef>
-                <a:spcPts val="0"/>
-              </a:spcBef>
-              <a:spcAft>
-                <a:spcPts val="0"/>
-              </a:spcAft>
-              <a:buNone/>
-            </a:pPr>
-            <a:r>
-              <a:rPr lang="en" sz="1000"/>
-              <a:t>0x8000 0008</a:t>
-            </a:r>
-            <a:endParaRPr sz="1000"/>
-          </a:p>
-        </p:txBody>
-      </p:sp>
-      <p:sp>
-        <p:nvSpPr>
-          <p:cNvPr id="245" name="Google Shape;245;p21"/>
-          <p:cNvSpPr/>
-          <p:nvPr/>
-        </p:nvSpPr>
-        <p:spPr>
-          <a:xfrm>
-            <a:off x="7315684" y="1384608"/>
-            <a:ext cx="558900" cy="345600"/>
-          </a:xfrm>
-          <a:prstGeom prst="rect">
-            <a:avLst/>
-          </a:prstGeom>
-          <a:solidFill>
-            <a:schemeClr val="lt2"/>
-          </a:solidFill>
-          <a:ln w="9525" cap="flat" cmpd="sng">
-            <a:solidFill>
-              <a:schemeClr val="dk2"/>
-            </a:solidFill>
-            <a:prstDash val="solid"/>
-            <a:round/>
-            <a:headEnd type="none" w="sm" len="sm"/>
-            <a:tailEnd type="none" w="sm" len="sm"/>
-          </a:ln>
-        </p:spPr>
-        <p:txBody>
-          <a:bodyPr spcFirstLastPara="1" wrap="square" lIns="91425" tIns="91425" rIns="91425" bIns="91425" anchor="ctr" anchorCtr="0">
-            <a:noAutofit/>
-          </a:bodyPr>
-          <a:lstStyle/>
-          <a:p>
-            <a:pPr marL="0" lvl="0" indent="0" algn="ctr" rtl="0">
-              <a:spcBef>
-                <a:spcPts val="0"/>
-              </a:spcBef>
-              <a:spcAft>
-                <a:spcPts val="0"/>
-              </a:spcAft>
-              <a:buNone/>
-            </a:pPr>
-            <a:r>
-              <a:rPr lang="en"/>
-              <a:t>0</a:t>
-            </a:r>
-            <a:endParaRPr/>
-          </a:p>
-        </p:txBody>
-      </p:sp>
-      <p:sp>
-        <p:nvSpPr>
-          <p:cNvPr id="246" name="Google Shape;246;p21"/>
-          <p:cNvSpPr/>
-          <p:nvPr/>
-        </p:nvSpPr>
-        <p:spPr>
-          <a:xfrm>
-            <a:off x="7885725" y="1369150"/>
-            <a:ext cx="1041300" cy="345600"/>
-          </a:xfrm>
-          <a:prstGeom prst="rect">
-            <a:avLst/>
-          </a:prstGeom>
-          <a:noFill/>
-          <a:ln>
-            <a:noFill/>
-          </a:ln>
-        </p:spPr>
-        <p:txBody>
-          <a:bodyPr spcFirstLastPara="1" wrap="square" lIns="91425" tIns="91425" rIns="91425" bIns="91425" anchor="ctr" anchorCtr="0">
-            <a:noAutofit/>
-          </a:bodyPr>
-          <a:lstStyle/>
-          <a:p>
-            <a:pPr marL="0" lvl="0" indent="0" algn="l" rtl="0">
-              <a:spcBef>
-                <a:spcPts val="0"/>
-              </a:spcBef>
-              <a:spcAft>
-                <a:spcPts val="0"/>
-              </a:spcAft>
-              <a:buNone/>
-            </a:pPr>
-            <a:r>
-              <a:rPr lang="en" sz="1000"/>
-              <a:t>0x8000 0007</a:t>
-            </a:r>
-            <a:endParaRPr sz="1000"/>
-          </a:p>
-        </p:txBody>
-      </p:sp>
-      <p:sp>
-        <p:nvSpPr>
-          <p:cNvPr id="247" name="Google Shape;247;p21"/>
-          <p:cNvSpPr/>
-          <p:nvPr/>
-        </p:nvSpPr>
-        <p:spPr>
-          <a:xfrm>
-            <a:off x="7315684" y="1730196"/>
-            <a:ext cx="558900" cy="345600"/>
-          </a:xfrm>
-          <a:prstGeom prst="rect">
-            <a:avLst/>
-          </a:prstGeom>
-          <a:solidFill>
-            <a:schemeClr val="lt2"/>
-          </a:solidFill>
-          <a:ln w="9525" cap="flat" cmpd="sng">
-            <a:solidFill>
-              <a:schemeClr val="dk2"/>
-            </a:solidFill>
-            <a:prstDash val="solid"/>
-            <a:round/>
-            <a:headEnd type="none" w="sm" len="sm"/>
-            <a:tailEnd type="none" w="sm" len="sm"/>
-          </a:ln>
-        </p:spPr>
-        <p:txBody>
-          <a:bodyPr spcFirstLastPara="1" wrap="square" lIns="91425" tIns="91425" rIns="91425" bIns="91425" anchor="ctr" anchorCtr="0">
-            <a:noAutofit/>
-          </a:bodyPr>
-          <a:lstStyle/>
-          <a:p>
-            <a:pPr marL="0" lvl="0" indent="0" algn="ctr" rtl="0">
-              <a:spcBef>
-                <a:spcPts val="0"/>
-              </a:spcBef>
-              <a:spcAft>
-                <a:spcPts val="0"/>
-              </a:spcAft>
-              <a:buNone/>
-            </a:pPr>
-            <a:r>
-              <a:rPr lang="en"/>
-              <a:t>37</a:t>
-            </a:r>
-            <a:endParaRPr/>
-          </a:p>
-        </p:txBody>
-      </p:sp>
-      <p:sp>
-        <p:nvSpPr>
-          <p:cNvPr id="248" name="Google Shape;248;p21"/>
-          <p:cNvSpPr/>
-          <p:nvPr/>
-        </p:nvSpPr>
-        <p:spPr>
-          <a:xfrm>
-            <a:off x="6666450" y="1730199"/>
-            <a:ext cx="649200" cy="345600"/>
-          </a:xfrm>
-          <a:prstGeom prst="rect">
-            <a:avLst/>
-          </a:prstGeom>
-          <a:noFill/>
-          <a:ln>
-            <a:noFill/>
-          </a:ln>
-        </p:spPr>
-        <p:txBody>
-          <a:bodyPr spcFirstLastPara="1" wrap="square" lIns="91425" tIns="91425" rIns="91425" bIns="91425" anchor="ctr" anchorCtr="0">
-            <a:noAutofit/>
-          </a:bodyPr>
-          <a:lstStyle/>
-          <a:p>
-            <a:pPr marL="0" lvl="0" indent="0" algn="r" rtl="0">
-              <a:spcBef>
-                <a:spcPts val="0"/>
-              </a:spcBef>
-              <a:spcAft>
-                <a:spcPts val="0"/>
-              </a:spcAft>
-              <a:buNone/>
-            </a:pPr>
-            <a:r>
-              <a:rPr lang="en" sz="1200"/>
-              <a:t>shant:</a:t>
-            </a:r>
-            <a:endParaRPr sz="1200"/>
-          </a:p>
-        </p:txBody>
-      </p:sp>
-      <p:sp>
-        <p:nvSpPr>
-          <p:cNvPr id="249" name="Google Shape;249;p21"/>
-          <p:cNvSpPr/>
-          <p:nvPr/>
-        </p:nvSpPr>
-        <p:spPr>
-          <a:xfrm>
-            <a:off x="7885725" y="1709600"/>
-            <a:ext cx="1041300" cy="345600"/>
-          </a:xfrm>
-          <a:prstGeom prst="rect">
-            <a:avLst/>
-          </a:prstGeom>
-          <a:noFill/>
-          <a:ln>
-            <a:noFill/>
-          </a:ln>
-        </p:spPr>
-        <p:txBody>
-          <a:bodyPr spcFirstLastPara="1" wrap="square" lIns="91425" tIns="91425" rIns="91425" bIns="91425" anchor="ctr" anchorCtr="0">
-            <a:noAutofit/>
-          </a:bodyPr>
-          <a:lstStyle/>
-          <a:p>
-            <a:pPr marL="0" lvl="0" indent="0" algn="l" rtl="0">
-              <a:spcBef>
-                <a:spcPts val="0"/>
-              </a:spcBef>
-              <a:spcAft>
-                <a:spcPts val="0"/>
-              </a:spcAft>
-              <a:buNone/>
-            </a:pPr>
-            <a:r>
-              <a:rPr lang="en" sz="1000"/>
-              <a:t>0x8000 0006</a:t>
-            </a:r>
-            <a:endParaRPr sz="1000"/>
-          </a:p>
-        </p:txBody>
-      </p:sp>
-      <p:sp>
-        <p:nvSpPr>
-          <p:cNvPr id="250" name="Google Shape;250;p21"/>
-          <p:cNvSpPr/>
-          <p:nvPr/>
-        </p:nvSpPr>
-        <p:spPr>
-          <a:xfrm>
-            <a:off x="7315684" y="2075808"/>
-            <a:ext cx="558900" cy="345600"/>
-          </a:xfrm>
-          <a:prstGeom prst="rect">
-            <a:avLst/>
-          </a:prstGeom>
-          <a:solidFill>
-            <a:schemeClr val="lt2"/>
-          </a:solidFill>
-          <a:ln w="9525" cap="flat" cmpd="sng">
-            <a:solidFill>
-              <a:schemeClr val="dk2"/>
-            </a:solidFill>
-            <a:prstDash val="solid"/>
-            <a:round/>
-            <a:headEnd type="none" w="sm" len="sm"/>
-            <a:tailEnd type="none" w="sm" len="sm"/>
-          </a:ln>
-        </p:spPr>
-        <p:txBody>
-          <a:bodyPr spcFirstLastPara="1" wrap="square" lIns="91425" tIns="91425" rIns="91425" bIns="91425" anchor="ctr" anchorCtr="0">
-            <a:noAutofit/>
-          </a:bodyPr>
-          <a:lstStyle/>
-          <a:p>
-            <a:pPr marL="0" lvl="0" indent="0" algn="ctr" rtl="0">
-              <a:spcBef>
-                <a:spcPts val="0"/>
-              </a:spcBef>
-              <a:spcAft>
-                <a:spcPts val="0"/>
-              </a:spcAft>
-              <a:buNone/>
-            </a:pPr>
-            <a:endParaRPr/>
-          </a:p>
-        </p:txBody>
-      </p:sp>
-      <p:sp>
-        <p:nvSpPr>
-          <p:cNvPr id="251" name="Google Shape;251;p21"/>
-          <p:cNvSpPr/>
-          <p:nvPr/>
-        </p:nvSpPr>
-        <p:spPr>
-          <a:xfrm>
-            <a:off x="7885725" y="2050050"/>
-            <a:ext cx="1041300" cy="345600"/>
-          </a:xfrm>
-          <a:prstGeom prst="rect">
-            <a:avLst/>
-          </a:prstGeom>
-          <a:noFill/>
-          <a:ln>
-            <a:noFill/>
-          </a:ln>
-        </p:spPr>
-        <p:txBody>
-          <a:bodyPr spcFirstLastPara="1" wrap="square" lIns="91425" tIns="91425" rIns="91425" bIns="91425" anchor="ctr" anchorCtr="0">
-            <a:noAutofit/>
-          </a:bodyPr>
-          <a:lstStyle/>
-          <a:p>
-            <a:pPr marL="0" lvl="0" indent="0" algn="l" rtl="0">
-              <a:spcBef>
-                <a:spcPts val="0"/>
-              </a:spcBef>
-              <a:spcAft>
-                <a:spcPts val="0"/>
-              </a:spcAft>
-              <a:buNone/>
-            </a:pPr>
-            <a:r>
-              <a:rPr lang="en" sz="1000"/>
-              <a:t>0x8000 0005</a:t>
-            </a:r>
-            <a:endParaRPr sz="1000"/>
-          </a:p>
-        </p:txBody>
-      </p:sp>
-      <p:sp>
-        <p:nvSpPr>
-          <p:cNvPr id="252" name="Google Shape;252;p21"/>
-          <p:cNvSpPr/>
-          <p:nvPr/>
-        </p:nvSpPr>
-        <p:spPr>
-          <a:xfrm>
-            <a:off x="7315684" y="2421396"/>
-            <a:ext cx="558900" cy="345600"/>
-          </a:xfrm>
-          <a:prstGeom prst="rect">
-            <a:avLst/>
-          </a:prstGeom>
-          <a:solidFill>
-            <a:schemeClr val="lt2"/>
-          </a:solidFill>
-          <a:ln w="9525" cap="flat" cmpd="sng">
-            <a:solidFill>
-              <a:schemeClr val="dk2"/>
-            </a:solidFill>
-            <a:prstDash val="solid"/>
-            <a:round/>
-            <a:headEnd type="none" w="sm" len="sm"/>
-            <a:tailEnd type="none" w="sm" len="sm"/>
-          </a:ln>
-        </p:spPr>
-        <p:txBody>
-          <a:bodyPr spcFirstLastPara="1" wrap="square" lIns="91425" tIns="91425" rIns="91425" bIns="91425" anchor="ctr" anchorCtr="0">
-            <a:noAutofit/>
-          </a:bodyPr>
-          <a:lstStyle/>
-          <a:p>
-            <a:pPr marL="0" lvl="0" indent="0" algn="ctr" rtl="0">
-              <a:spcBef>
-                <a:spcPts val="0"/>
-              </a:spcBef>
-              <a:spcAft>
-                <a:spcPts val="0"/>
-              </a:spcAft>
-              <a:buClr>
-                <a:schemeClr val="dk1"/>
-              </a:buClr>
-              <a:buSzPts val="1100"/>
-              <a:buFont typeface="Arial"/>
-              <a:buNone/>
-            </a:pPr>
-            <a:r>
-              <a:rPr lang="en" sz="1300">
-                <a:solidFill>
-                  <a:schemeClr val="dk1"/>
-                </a:solidFill>
-              </a:rPr>
-              <a:t>32</a:t>
-            </a:r>
-            <a:endParaRPr sz="1300"/>
-          </a:p>
-        </p:txBody>
-      </p:sp>
-      <p:sp>
-        <p:nvSpPr>
-          <p:cNvPr id="253" name="Google Shape;253;p21"/>
-          <p:cNvSpPr/>
-          <p:nvPr/>
-        </p:nvSpPr>
-        <p:spPr>
-          <a:xfrm>
-            <a:off x="6325950" y="2421402"/>
-            <a:ext cx="989700" cy="345600"/>
-          </a:xfrm>
-          <a:prstGeom prst="rect">
-            <a:avLst/>
-          </a:prstGeom>
-          <a:noFill/>
-          <a:ln>
-            <a:noFill/>
-          </a:ln>
-        </p:spPr>
-        <p:txBody>
-          <a:bodyPr spcFirstLastPara="1" wrap="square" lIns="91425" tIns="91425" rIns="91425" bIns="91425" anchor="ctr" anchorCtr="0">
-            <a:noAutofit/>
-          </a:bodyPr>
-          <a:lstStyle/>
-          <a:p>
-            <a:pPr marL="0" lvl="0" indent="0" algn="r" rtl="0">
-              <a:spcBef>
-                <a:spcPts val="0"/>
-              </a:spcBef>
-              <a:spcAft>
-                <a:spcPts val="0"/>
-              </a:spcAft>
-              <a:buNone/>
-            </a:pPr>
-            <a:r>
-              <a:rPr lang="en" sz="1200"/>
-              <a:t>steven:</a:t>
-            </a:r>
-            <a:endParaRPr sz="1200"/>
-          </a:p>
-        </p:txBody>
-      </p:sp>
-      <p:sp>
-        <p:nvSpPr>
-          <p:cNvPr id="254" name="Google Shape;254;p21"/>
-          <p:cNvSpPr/>
-          <p:nvPr/>
-        </p:nvSpPr>
-        <p:spPr>
-          <a:xfrm>
-            <a:off x="7874575" y="2390500"/>
-            <a:ext cx="1041300" cy="345600"/>
-          </a:xfrm>
-          <a:prstGeom prst="rect">
-            <a:avLst/>
-          </a:prstGeom>
-          <a:noFill/>
-          <a:ln>
-            <a:noFill/>
-          </a:ln>
-        </p:spPr>
-        <p:txBody>
-          <a:bodyPr spcFirstLastPara="1" wrap="square" lIns="91425" tIns="91425" rIns="91425" bIns="91425" anchor="ctr" anchorCtr="0">
-            <a:noAutofit/>
-          </a:bodyPr>
-          <a:lstStyle/>
-          <a:p>
-            <a:pPr marL="0" lvl="0" indent="0" algn="l" rtl="0">
-              <a:spcBef>
-                <a:spcPts val="0"/>
-              </a:spcBef>
-              <a:spcAft>
-                <a:spcPts val="0"/>
-              </a:spcAft>
-              <a:buNone/>
-            </a:pPr>
-            <a:r>
-              <a:rPr lang="en" sz="1000"/>
-              <a:t>0x8000 0004</a:t>
-            </a:r>
-            <a:endParaRPr sz="1000"/>
-          </a:p>
-        </p:txBody>
-      </p:sp>
-      <p:sp>
-        <p:nvSpPr>
-          <p:cNvPr id="255" name="Google Shape;255;p21"/>
-          <p:cNvSpPr/>
-          <p:nvPr/>
-        </p:nvSpPr>
-        <p:spPr>
-          <a:xfrm>
-            <a:off x="7315684" y="2715508"/>
-            <a:ext cx="558900" cy="345600"/>
-          </a:xfrm>
-          <a:prstGeom prst="rect">
-            <a:avLst/>
-          </a:prstGeom>
-          <a:solidFill>
-            <a:schemeClr val="lt2"/>
-          </a:solidFill>
-          <a:ln w="9525" cap="flat" cmpd="sng">
-            <a:solidFill>
-              <a:schemeClr val="dk2"/>
-            </a:solidFill>
-            <a:prstDash val="solid"/>
-            <a:round/>
-            <a:headEnd type="none" w="sm" len="sm"/>
-            <a:tailEnd type="none" w="sm" len="sm"/>
-          </a:ln>
-        </p:spPr>
-        <p:txBody>
-          <a:bodyPr spcFirstLastPara="1" wrap="square" lIns="91425" tIns="91425" rIns="91425" bIns="91425" anchor="ctr" anchorCtr="0">
-            <a:noAutofit/>
-          </a:bodyPr>
-          <a:lstStyle/>
-          <a:p>
-            <a:pPr marL="0" lvl="0" indent="0" algn="ctr" rtl="0">
-              <a:spcBef>
-                <a:spcPts val="0"/>
-              </a:spcBef>
-              <a:spcAft>
-                <a:spcPts val="0"/>
-              </a:spcAft>
-              <a:buNone/>
-            </a:pPr>
-            <a:r>
-              <a:rPr lang="en"/>
-              <a:t>?</a:t>
-            </a:r>
-            <a:endParaRPr/>
-          </a:p>
-        </p:txBody>
-      </p:sp>
-      <p:sp>
-        <p:nvSpPr>
-          <p:cNvPr id="256" name="Google Shape;256;p21"/>
-          <p:cNvSpPr/>
-          <p:nvPr/>
-        </p:nvSpPr>
-        <p:spPr>
-          <a:xfrm>
-            <a:off x="6430350" y="2715502"/>
-            <a:ext cx="885300" cy="345600"/>
-          </a:xfrm>
-          <a:prstGeom prst="rect">
-            <a:avLst/>
-          </a:prstGeom>
-          <a:noFill/>
-          <a:ln>
-            <a:noFill/>
-          </a:ln>
-        </p:spPr>
-        <p:txBody>
-          <a:bodyPr spcFirstLastPara="1" wrap="square" lIns="91425" tIns="91425" rIns="91425" bIns="91425" anchor="ctr" anchorCtr="0">
-            <a:noAutofit/>
-          </a:bodyPr>
-          <a:lstStyle/>
-          <a:p>
-            <a:pPr marL="0" lvl="0" indent="0" algn="r" rtl="0">
-              <a:spcBef>
-                <a:spcPts val="0"/>
-              </a:spcBef>
-              <a:spcAft>
-                <a:spcPts val="0"/>
-              </a:spcAft>
-              <a:buNone/>
-            </a:pPr>
-            <a:r>
-              <a:rPr lang="en" sz="1200"/>
-              <a:t>syndey:</a:t>
-            </a:r>
-            <a:endParaRPr sz="1200"/>
-          </a:p>
-        </p:txBody>
-      </p:sp>
-      <p:sp>
-        <p:nvSpPr>
-          <p:cNvPr id="257" name="Google Shape;257;p21"/>
-          <p:cNvSpPr/>
-          <p:nvPr/>
-        </p:nvSpPr>
-        <p:spPr>
-          <a:xfrm>
-            <a:off x="7885725" y="2730950"/>
-            <a:ext cx="1041300" cy="345600"/>
-          </a:xfrm>
-          <a:prstGeom prst="rect">
-            <a:avLst/>
-          </a:prstGeom>
-          <a:noFill/>
-          <a:ln>
-            <a:noFill/>
-          </a:ln>
-        </p:spPr>
-        <p:txBody>
-          <a:bodyPr spcFirstLastPara="1" wrap="square" lIns="91425" tIns="91425" rIns="91425" bIns="91425" anchor="ctr" anchorCtr="0">
-            <a:noAutofit/>
-          </a:bodyPr>
-          <a:lstStyle/>
-          <a:p>
-            <a:pPr marL="0" lvl="0" indent="0" algn="l" rtl="0">
-              <a:spcBef>
-                <a:spcPts val="0"/>
-              </a:spcBef>
-              <a:spcAft>
-                <a:spcPts val="0"/>
-              </a:spcAft>
-              <a:buNone/>
-            </a:pPr>
-            <a:r>
-              <a:rPr lang="en" sz="1000"/>
-              <a:t>0x8000 0003</a:t>
-            </a:r>
-            <a:endParaRPr sz="1000"/>
-          </a:p>
-        </p:txBody>
-      </p:sp>
-      <p:sp>
-        <p:nvSpPr>
-          <p:cNvPr id="258" name="Google Shape;258;p21"/>
-          <p:cNvSpPr/>
-          <p:nvPr/>
-        </p:nvSpPr>
-        <p:spPr>
-          <a:xfrm>
-            <a:off x="7315684" y="3061096"/>
-            <a:ext cx="558900" cy="345600"/>
-          </a:xfrm>
-          <a:prstGeom prst="rect">
-            <a:avLst/>
-          </a:prstGeom>
-          <a:solidFill>
-            <a:schemeClr val="lt2"/>
-          </a:solidFill>
-          <a:ln w="9525" cap="flat" cmpd="sng">
-            <a:solidFill>
-              <a:schemeClr val="dk2"/>
-            </a:solidFill>
-            <a:prstDash val="solid"/>
-            <a:round/>
-            <a:headEnd type="none" w="sm" len="sm"/>
-            <a:tailEnd type="none" w="sm" len="sm"/>
-          </a:ln>
-        </p:spPr>
-        <p:txBody>
-          <a:bodyPr spcFirstLastPara="1" wrap="square" lIns="91425" tIns="91425" rIns="91425" bIns="91425" anchor="ctr" anchorCtr="0">
-            <a:noAutofit/>
-          </a:bodyPr>
-          <a:lstStyle/>
-          <a:p>
-            <a:pPr marL="0" lvl="0" indent="0" algn="ctr" rtl="0">
-              <a:spcBef>
-                <a:spcPts val="0"/>
-              </a:spcBef>
-              <a:spcAft>
-                <a:spcPts val="0"/>
-              </a:spcAft>
-              <a:buNone/>
-            </a:pPr>
-            <a:r>
-              <a:rPr lang="en"/>
-              <a:t>45</a:t>
-            </a:r>
-            <a:endParaRPr/>
-          </a:p>
-        </p:txBody>
-      </p:sp>
-      <p:sp>
-        <p:nvSpPr>
-          <p:cNvPr id="259" name="Google Shape;259;p21"/>
-          <p:cNvSpPr/>
-          <p:nvPr/>
-        </p:nvSpPr>
-        <p:spPr>
-          <a:xfrm>
-            <a:off x="7885725" y="3071400"/>
-            <a:ext cx="1041300" cy="345600"/>
-          </a:xfrm>
-          <a:prstGeom prst="rect">
-            <a:avLst/>
-          </a:prstGeom>
-          <a:noFill/>
-          <a:ln>
-            <a:noFill/>
-          </a:ln>
-        </p:spPr>
-        <p:txBody>
-          <a:bodyPr spcFirstLastPara="1" wrap="square" lIns="91425" tIns="91425" rIns="91425" bIns="91425" anchor="ctr" anchorCtr="0">
-            <a:noAutofit/>
-          </a:bodyPr>
-          <a:lstStyle/>
-          <a:p>
-            <a:pPr marL="0" lvl="0" indent="0" algn="l" rtl="0">
-              <a:spcBef>
-                <a:spcPts val="0"/>
-              </a:spcBef>
-              <a:spcAft>
-                <a:spcPts val="0"/>
-              </a:spcAft>
-              <a:buNone/>
-            </a:pPr>
-            <a:r>
-              <a:rPr lang="en" sz="1000"/>
-              <a:t>0x8000 0002</a:t>
-            </a:r>
-            <a:endParaRPr sz="1000"/>
-          </a:p>
-        </p:txBody>
-      </p:sp>
-      <p:sp>
-        <p:nvSpPr>
-          <p:cNvPr id="260" name="Google Shape;260;p21"/>
-          <p:cNvSpPr/>
-          <p:nvPr/>
-        </p:nvSpPr>
-        <p:spPr>
-          <a:xfrm>
-            <a:off x="7315684" y="3406708"/>
-            <a:ext cx="558900" cy="345600"/>
-          </a:xfrm>
-          <a:prstGeom prst="rect">
-            <a:avLst/>
-          </a:prstGeom>
-          <a:solidFill>
-            <a:schemeClr val="lt2"/>
-          </a:solidFill>
-          <a:ln w="9525" cap="flat" cmpd="sng">
-            <a:solidFill>
-              <a:schemeClr val="dk2"/>
-            </a:solidFill>
-            <a:prstDash val="solid"/>
-            <a:round/>
-            <a:headEnd type="none" w="sm" len="sm"/>
-            <a:tailEnd type="none" w="sm" len="sm"/>
-          </a:ln>
-        </p:spPr>
-        <p:txBody>
-          <a:bodyPr spcFirstLastPara="1" wrap="square" lIns="91425" tIns="91425" rIns="91425" bIns="91425" anchor="ctr" anchorCtr="0">
-            <a:noAutofit/>
-          </a:bodyPr>
-          <a:lstStyle/>
-          <a:p>
-            <a:pPr marL="0" lvl="0" indent="0" algn="ctr" rtl="0">
-              <a:spcBef>
-                <a:spcPts val="0"/>
-              </a:spcBef>
-              <a:spcAft>
-                <a:spcPts val="0"/>
-              </a:spcAft>
-              <a:buNone/>
-            </a:pPr>
-            <a:r>
-              <a:rPr lang="en"/>
-              <a:t>1</a:t>
-            </a:r>
-            <a:endParaRPr/>
-          </a:p>
-        </p:txBody>
-      </p:sp>
-      <p:sp>
-        <p:nvSpPr>
-          <p:cNvPr id="261" name="Google Shape;261;p21"/>
-          <p:cNvSpPr/>
-          <p:nvPr/>
-        </p:nvSpPr>
-        <p:spPr>
-          <a:xfrm>
-            <a:off x="6666450" y="3406701"/>
-            <a:ext cx="649200" cy="345600"/>
-          </a:xfrm>
-          <a:prstGeom prst="rect">
-            <a:avLst/>
-          </a:prstGeom>
-          <a:noFill/>
-          <a:ln>
-            <a:noFill/>
-          </a:ln>
-        </p:spPr>
-        <p:txBody>
-          <a:bodyPr spcFirstLastPara="1" wrap="square" lIns="91425" tIns="91425" rIns="91425" bIns="91425" anchor="ctr" anchorCtr="0">
-            <a:noAutofit/>
-          </a:bodyPr>
-          <a:lstStyle/>
-          <a:p>
-            <a:pPr marL="0" lvl="0" indent="0" algn="r" rtl="0">
-              <a:spcBef>
-                <a:spcPts val="0"/>
-              </a:spcBef>
-              <a:spcAft>
-                <a:spcPts val="0"/>
-              </a:spcAft>
-              <a:buNone/>
-            </a:pPr>
-            <a:r>
-              <a:rPr lang="en" sz="1200"/>
-              <a:t>tyler:</a:t>
-            </a:r>
-            <a:endParaRPr sz="1200"/>
-          </a:p>
-        </p:txBody>
-      </p:sp>
-      <p:sp>
-        <p:nvSpPr>
-          <p:cNvPr id="262" name="Google Shape;262;p21"/>
-          <p:cNvSpPr/>
-          <p:nvPr/>
-        </p:nvSpPr>
-        <p:spPr>
-          <a:xfrm>
-            <a:off x="7885725" y="3411850"/>
-            <a:ext cx="1041300" cy="345600"/>
-          </a:xfrm>
-          <a:prstGeom prst="rect">
-            <a:avLst/>
-          </a:prstGeom>
-          <a:noFill/>
-          <a:ln>
-            <a:noFill/>
-          </a:ln>
-        </p:spPr>
-        <p:txBody>
-          <a:bodyPr spcFirstLastPara="1" wrap="square" lIns="91425" tIns="91425" rIns="91425" bIns="91425" anchor="ctr" anchorCtr="0">
-            <a:noAutofit/>
-          </a:bodyPr>
-          <a:lstStyle/>
-          <a:p>
-            <a:pPr marL="0" lvl="0" indent="0" algn="l" rtl="0">
-              <a:spcBef>
-                <a:spcPts val="0"/>
-              </a:spcBef>
-              <a:spcAft>
-                <a:spcPts val="0"/>
-              </a:spcAft>
-              <a:buNone/>
-            </a:pPr>
-            <a:r>
-              <a:rPr lang="en" sz="1000"/>
-              <a:t>0x8000 0001</a:t>
-            </a:r>
-            <a:endParaRPr sz="1000"/>
-          </a:p>
-        </p:txBody>
-      </p:sp>
-      <p:sp>
-        <p:nvSpPr>
-          <p:cNvPr id="263" name="Google Shape;263;p21"/>
-          <p:cNvSpPr/>
-          <p:nvPr/>
-        </p:nvSpPr>
-        <p:spPr>
-          <a:xfrm>
-            <a:off x="7315684" y="3752296"/>
-            <a:ext cx="558900" cy="345600"/>
-          </a:xfrm>
-          <a:prstGeom prst="rect">
-            <a:avLst/>
-          </a:prstGeom>
-          <a:solidFill>
-            <a:schemeClr val="lt2"/>
-          </a:solidFill>
-          <a:ln w="9525" cap="flat" cmpd="sng">
-            <a:solidFill>
-              <a:schemeClr val="dk2"/>
-            </a:solidFill>
-            <a:prstDash val="solid"/>
-            <a:round/>
-            <a:headEnd type="none" w="sm" len="sm"/>
-            <a:tailEnd type="none" w="sm" len="sm"/>
-          </a:ln>
-        </p:spPr>
-        <p:txBody>
-          <a:bodyPr spcFirstLastPara="1" wrap="square" lIns="91425" tIns="91425" rIns="91425" bIns="91425" anchor="ctr" anchorCtr="0">
-            <a:noAutofit/>
-          </a:bodyPr>
-          <a:lstStyle/>
-          <a:p>
-            <a:pPr marL="0" lvl="0" indent="0" algn="ctr" rtl="0">
-              <a:spcBef>
-                <a:spcPts val="0"/>
-              </a:spcBef>
-              <a:spcAft>
-                <a:spcPts val="0"/>
-              </a:spcAft>
-              <a:buNone/>
-            </a:pPr>
-            <a:r>
-              <a:rPr lang="en"/>
-              <a:t>0</a:t>
-            </a:r>
-            <a:endParaRPr/>
-          </a:p>
-        </p:txBody>
-      </p:sp>
-      <p:sp>
-        <p:nvSpPr>
-          <p:cNvPr id="264" name="Google Shape;264;p21"/>
-          <p:cNvSpPr/>
-          <p:nvPr/>
-        </p:nvSpPr>
-        <p:spPr>
-          <a:xfrm>
-            <a:off x="7885725" y="3752300"/>
-            <a:ext cx="1041300" cy="345600"/>
-          </a:xfrm>
-          <a:prstGeom prst="rect">
-            <a:avLst/>
-          </a:prstGeom>
-          <a:noFill/>
-          <a:ln>
-            <a:noFill/>
-          </a:ln>
-        </p:spPr>
-        <p:txBody>
-          <a:bodyPr spcFirstLastPara="1" wrap="square" lIns="91425" tIns="91425" rIns="91425" bIns="91425" anchor="ctr" anchorCtr="0">
-            <a:noAutofit/>
-          </a:bodyPr>
-          <a:lstStyle/>
-          <a:p>
-            <a:pPr marL="0" lvl="0" indent="0" algn="l" rtl="0">
-              <a:spcBef>
-                <a:spcPts val="0"/>
-              </a:spcBef>
-              <a:spcAft>
-                <a:spcPts val="0"/>
-              </a:spcAft>
-              <a:buNone/>
-            </a:pPr>
-            <a:r>
-              <a:rPr lang="en" sz="1000"/>
-              <a:t>0x8000 0000</a:t>
-            </a:r>
-            <a:endParaRPr sz="1000"/>
           </a:p>
         </p:txBody>
       </p:sp>

</xml_diff>